<commit_message>
Atualização de vários docs e apresentação do Analyze
</commit_message>
<xml_diff>
--- a/Apresentações/TRE DMAIC - Analyze.pptx
+++ b/Apresentações/TRE DMAIC - Analyze.pptx
@@ -11,11 +11,14 @@
     <p:sldId id="271" r:id="rId5"/>
     <p:sldId id="260" r:id="rId6"/>
     <p:sldId id="264" r:id="rId7"/>
-    <p:sldId id="269" r:id="rId8"/>
-    <p:sldId id="266" r:id="rId9"/>
-    <p:sldId id="267" r:id="rId10"/>
-    <p:sldId id="270" r:id="rId11"/>
-    <p:sldId id="268" r:id="rId12"/>
+    <p:sldId id="272" r:id="rId8"/>
+    <p:sldId id="273" r:id="rId9"/>
+    <p:sldId id="274" r:id="rId10"/>
+    <p:sldId id="269" r:id="rId11"/>
+    <p:sldId id="266" r:id="rId12"/>
+    <p:sldId id="267" r:id="rId13"/>
+    <p:sldId id="270" r:id="rId14"/>
+    <p:sldId id="268" r:id="rId15"/>
   </p:sldIdLst>
   <p:sldSz cx="12192000" cy="6858000"/>
   <p:notesSz cx="6858000" cy="9144000"/>
@@ -1207,10 +1210,24 @@
     <dgm:pt modelId="{0D00317D-1F9F-40CE-B93B-73D212302F9B}" type="pres">
       <dgm:prSet presAssocID="{D9A0E1B3-40F8-4A0B-B01C-448DDF255809}" presName="sibTrans" presStyleLbl="sibTrans2D1" presStyleIdx="0" presStyleCnt="7"/>
       <dgm:spPr/>
+      <dgm:t>
+        <a:bodyPr/>
+        <a:lstStyle/>
+        <a:p>
+          <a:endParaRPr lang="pt-BR"/>
+        </a:p>
+      </dgm:t>
     </dgm:pt>
     <dgm:pt modelId="{6695DA87-83A0-495F-84F4-AB098357C1CA}" type="pres">
       <dgm:prSet presAssocID="{D9A0E1B3-40F8-4A0B-B01C-448DDF255809}" presName="connectorText" presStyleLbl="sibTrans2D1" presStyleIdx="0" presStyleCnt="7"/>
       <dgm:spPr/>
+      <dgm:t>
+        <a:bodyPr/>
+        <a:lstStyle/>
+        <a:p>
+          <a:endParaRPr lang="pt-BR"/>
+        </a:p>
+      </dgm:t>
     </dgm:pt>
     <dgm:pt modelId="{973FA5A7-83FB-40F4-A2DB-45274D12C016}" type="pres">
       <dgm:prSet presAssocID="{2FE62AC5-280A-4A9B-9DBF-3BB514515D9B}" presName="node" presStyleLbl="node1" presStyleIdx="1" presStyleCnt="8">
@@ -1230,10 +1247,24 @@
     <dgm:pt modelId="{494A9037-2260-4DE2-B595-D6E21AEEB7EC}" type="pres">
       <dgm:prSet presAssocID="{01307C35-FB85-43CF-A4FB-8EBC20798E86}" presName="sibTrans" presStyleLbl="sibTrans2D1" presStyleIdx="1" presStyleCnt="7"/>
       <dgm:spPr/>
+      <dgm:t>
+        <a:bodyPr/>
+        <a:lstStyle/>
+        <a:p>
+          <a:endParaRPr lang="pt-BR"/>
+        </a:p>
+      </dgm:t>
     </dgm:pt>
     <dgm:pt modelId="{73AA256C-7E13-430A-87A4-637839473AAB}" type="pres">
       <dgm:prSet presAssocID="{01307C35-FB85-43CF-A4FB-8EBC20798E86}" presName="connectorText" presStyleLbl="sibTrans2D1" presStyleIdx="1" presStyleCnt="7"/>
       <dgm:spPr/>
+      <dgm:t>
+        <a:bodyPr/>
+        <a:lstStyle/>
+        <a:p>
+          <a:endParaRPr lang="pt-BR"/>
+        </a:p>
+      </dgm:t>
     </dgm:pt>
     <dgm:pt modelId="{59098B63-7FED-408D-A813-C8982841BFA6}" type="pres">
       <dgm:prSet presAssocID="{088066A9-26DC-4DAD-9FD2-5DB4A495594E}" presName="node" presStyleLbl="node1" presStyleIdx="2" presStyleCnt="8">
@@ -1253,10 +1284,24 @@
     <dgm:pt modelId="{DE3C5F5A-F4C7-40C4-AEB3-A125514E4B40}" type="pres">
       <dgm:prSet presAssocID="{A4BF13A6-808D-41AE-9F1A-B6DEFC4EFF73}" presName="sibTrans" presStyleLbl="sibTrans2D1" presStyleIdx="2" presStyleCnt="7"/>
       <dgm:spPr/>
+      <dgm:t>
+        <a:bodyPr/>
+        <a:lstStyle/>
+        <a:p>
+          <a:endParaRPr lang="pt-BR"/>
+        </a:p>
+      </dgm:t>
     </dgm:pt>
     <dgm:pt modelId="{ED580F5A-9777-4C1F-B514-4FFFBC518BF7}" type="pres">
       <dgm:prSet presAssocID="{A4BF13A6-808D-41AE-9F1A-B6DEFC4EFF73}" presName="connectorText" presStyleLbl="sibTrans2D1" presStyleIdx="2" presStyleCnt="7"/>
       <dgm:spPr/>
+      <dgm:t>
+        <a:bodyPr/>
+        <a:lstStyle/>
+        <a:p>
+          <a:endParaRPr lang="pt-BR"/>
+        </a:p>
+      </dgm:t>
     </dgm:pt>
     <dgm:pt modelId="{AC9308C5-0228-4EC0-9A80-03A61FB69966}" type="pres">
       <dgm:prSet presAssocID="{911C9649-F09F-4E47-949E-B8E423480905}" presName="node" presStyleLbl="node1" presStyleIdx="3" presStyleCnt="8">
@@ -1276,10 +1321,24 @@
     <dgm:pt modelId="{25A125EA-4E1F-4A84-83A6-F7A10548526F}" type="pres">
       <dgm:prSet presAssocID="{C34E6AE6-1A28-427D-9DBB-F07182E0C601}" presName="sibTrans" presStyleLbl="sibTrans2D1" presStyleIdx="3" presStyleCnt="7"/>
       <dgm:spPr/>
+      <dgm:t>
+        <a:bodyPr/>
+        <a:lstStyle/>
+        <a:p>
+          <a:endParaRPr lang="pt-BR"/>
+        </a:p>
+      </dgm:t>
     </dgm:pt>
     <dgm:pt modelId="{1C393F61-6B61-4A63-B37D-C67BF2BE5738}" type="pres">
       <dgm:prSet presAssocID="{C34E6AE6-1A28-427D-9DBB-F07182E0C601}" presName="connectorText" presStyleLbl="sibTrans2D1" presStyleIdx="3" presStyleCnt="7"/>
       <dgm:spPr/>
+      <dgm:t>
+        <a:bodyPr/>
+        <a:lstStyle/>
+        <a:p>
+          <a:endParaRPr lang="pt-BR"/>
+        </a:p>
+      </dgm:t>
     </dgm:pt>
     <dgm:pt modelId="{E1BD6FF4-D542-42EA-B09D-40572FCB24DB}" type="pres">
       <dgm:prSet presAssocID="{98797823-FAE4-4EA2-A04B-AD0B1991DD69}" presName="node" presStyleLbl="node1" presStyleIdx="4" presStyleCnt="8">
@@ -1299,10 +1358,24 @@
     <dgm:pt modelId="{AE9DB057-DB4E-4AE4-994F-597651176A96}" type="pres">
       <dgm:prSet presAssocID="{61724E91-98A3-4459-8AA6-4A592E331E2E}" presName="sibTrans" presStyleLbl="sibTrans2D1" presStyleIdx="4" presStyleCnt="7"/>
       <dgm:spPr/>
+      <dgm:t>
+        <a:bodyPr/>
+        <a:lstStyle/>
+        <a:p>
+          <a:endParaRPr lang="pt-BR"/>
+        </a:p>
+      </dgm:t>
     </dgm:pt>
     <dgm:pt modelId="{0606162D-BB47-4FE7-B341-F0D28A0C2475}" type="pres">
       <dgm:prSet presAssocID="{61724E91-98A3-4459-8AA6-4A592E331E2E}" presName="connectorText" presStyleLbl="sibTrans2D1" presStyleIdx="4" presStyleCnt="7"/>
       <dgm:spPr/>
+      <dgm:t>
+        <a:bodyPr/>
+        <a:lstStyle/>
+        <a:p>
+          <a:endParaRPr lang="pt-BR"/>
+        </a:p>
+      </dgm:t>
     </dgm:pt>
     <dgm:pt modelId="{5CFB361A-E8FF-4A00-9A9E-218DD332A7C1}" type="pres">
       <dgm:prSet presAssocID="{E27B196C-DF3E-4D50-B5E4-B1C7AE834579}" presName="node" presStyleLbl="node1" presStyleIdx="5" presStyleCnt="8" custLinFactX="-116648" custLinFactY="47875" custLinFactNeighborX="-200000" custLinFactNeighborY="100000">
@@ -1322,10 +1395,24 @@
     <dgm:pt modelId="{AD6F85CF-E0A7-420D-B41E-B96673FC5338}" type="pres">
       <dgm:prSet presAssocID="{4274979B-230F-4246-951A-F22F78D69028}" presName="sibTrans" presStyleLbl="sibTrans2D1" presStyleIdx="5" presStyleCnt="7"/>
       <dgm:spPr/>
+      <dgm:t>
+        <a:bodyPr/>
+        <a:lstStyle/>
+        <a:p>
+          <a:endParaRPr lang="pt-BR"/>
+        </a:p>
+      </dgm:t>
     </dgm:pt>
     <dgm:pt modelId="{AA2E9E5A-FE97-4F49-91E2-E59938094442}" type="pres">
       <dgm:prSet presAssocID="{4274979B-230F-4246-951A-F22F78D69028}" presName="connectorText" presStyleLbl="sibTrans2D1" presStyleIdx="5" presStyleCnt="7"/>
       <dgm:spPr/>
+      <dgm:t>
+        <a:bodyPr/>
+        <a:lstStyle/>
+        <a:p>
+          <a:endParaRPr lang="pt-BR"/>
+        </a:p>
+      </dgm:t>
     </dgm:pt>
     <dgm:pt modelId="{E0CDA61B-FDA4-4FA5-A2F3-965314EC53FC}" type="pres">
       <dgm:prSet presAssocID="{84C2AAA0-DC8C-486A-855B-4B9F4BACC51C}" presName="node" presStyleLbl="node1" presStyleIdx="6" presStyleCnt="8" custLinFactX="-95469" custLinFactY="47875" custLinFactNeighborX="-100000" custLinFactNeighborY="100000">
@@ -1345,10 +1432,24 @@
     <dgm:pt modelId="{96AC33B3-5D5E-4E22-AEF4-025C0C5DB44C}" type="pres">
       <dgm:prSet presAssocID="{CA484139-D5E6-4582-BE84-DC71CC1A0BF3}" presName="sibTrans" presStyleLbl="sibTrans2D1" presStyleIdx="6" presStyleCnt="7"/>
       <dgm:spPr/>
+      <dgm:t>
+        <a:bodyPr/>
+        <a:lstStyle/>
+        <a:p>
+          <a:endParaRPr lang="pt-BR"/>
+        </a:p>
+      </dgm:t>
     </dgm:pt>
     <dgm:pt modelId="{ABC0DC35-4025-4250-8E21-F2000B512F7A}" type="pres">
       <dgm:prSet presAssocID="{CA484139-D5E6-4582-BE84-DC71CC1A0BF3}" presName="connectorText" presStyleLbl="sibTrans2D1" presStyleIdx="6" presStyleCnt="7"/>
       <dgm:spPr/>
+      <dgm:t>
+        <a:bodyPr/>
+        <a:lstStyle/>
+        <a:p>
+          <a:endParaRPr lang="pt-BR"/>
+        </a:p>
+      </dgm:t>
     </dgm:pt>
     <dgm:pt modelId="{DF66BDFE-BC43-424F-8DF1-B69DD604C968}" type="pres">
       <dgm:prSet presAssocID="{2454D6AA-B5A6-46A5-911C-2D2D8002CE7B}" presName="node" presStyleLbl="node1" presStyleIdx="7" presStyleCnt="8" custLinFactX="-26163" custLinFactY="47875" custLinFactNeighborX="-100000" custLinFactNeighborY="100000">
@@ -1367,37 +1468,37 @@
     </dgm:pt>
   </dgm:ptLst>
   <dgm:cxnLst>
-    <dgm:cxn modelId="{6EEBE262-FA83-469E-A2C4-32F79C6A83CD}" type="presOf" srcId="{8A4B13F2-E876-4462-8DE1-6FF39E81D27A}" destId="{4E3A8CC7-6599-47F6-882D-C999A174994A}" srcOrd="0" destOrd="0" presId="urn:microsoft.com/office/officeart/2005/8/layout/process1"/>
-    <dgm:cxn modelId="{13E4FB3E-E614-40CD-AC02-4BAF70653E8A}" type="presOf" srcId="{A4BF13A6-808D-41AE-9F1A-B6DEFC4EFF73}" destId="{ED580F5A-9777-4C1F-B514-4FFFBC518BF7}" srcOrd="1" destOrd="0" presId="urn:microsoft.com/office/officeart/2005/8/layout/process1"/>
+    <dgm:cxn modelId="{006CA85A-F381-44A4-851D-20C86D256A2D}" type="presOf" srcId="{D9A0E1B3-40F8-4A0B-B01C-448DDF255809}" destId="{6695DA87-83A0-495F-84F4-AB098357C1CA}" srcOrd="1" destOrd="0" presId="urn:microsoft.com/office/officeart/2005/8/layout/process1"/>
+    <dgm:cxn modelId="{F16A3988-F61B-4129-8594-9A95EA0A9CFC}" srcId="{98ECDF51-0C2C-4BD4-A143-8260D47E5C7C}" destId="{911C9649-F09F-4E47-949E-B8E423480905}" srcOrd="3" destOrd="0" parTransId="{47550EED-5170-458D-9D8D-F3A2DCCA1CF3}" sibTransId="{C34E6AE6-1A28-427D-9DBB-F07182E0C601}"/>
+    <dgm:cxn modelId="{3801D387-3F57-4EFB-9B5C-AA95E92C17E7}" type="presOf" srcId="{088066A9-26DC-4DAD-9FD2-5DB4A495594E}" destId="{59098B63-7FED-408D-A813-C8982841BFA6}" srcOrd="0" destOrd="0" presId="urn:microsoft.com/office/officeart/2005/8/layout/process1"/>
     <dgm:cxn modelId="{273F3AFB-72F6-43CF-B3DA-7BC1FCAA0B7D}" type="presOf" srcId="{98797823-FAE4-4EA2-A04B-AD0B1991DD69}" destId="{E1BD6FF4-D542-42EA-B09D-40572FCB24DB}" srcOrd="0" destOrd="0" presId="urn:microsoft.com/office/officeart/2005/8/layout/process1"/>
+    <dgm:cxn modelId="{4CA25C0E-E814-44A5-ABC3-C30DE6715AAD}" type="presOf" srcId="{911C9649-F09F-4E47-949E-B8E423480905}" destId="{AC9308C5-0228-4EC0-9A80-03A61FB69966}" srcOrd="0" destOrd="0" presId="urn:microsoft.com/office/officeart/2005/8/layout/process1"/>
+    <dgm:cxn modelId="{B5EE4EE4-2C58-4676-8913-FE65080189C7}" type="presOf" srcId="{61724E91-98A3-4459-8AA6-4A592E331E2E}" destId="{AE9DB057-DB4E-4AE4-994F-597651176A96}" srcOrd="0" destOrd="0" presId="urn:microsoft.com/office/officeart/2005/8/layout/process1"/>
+    <dgm:cxn modelId="{9B32E014-4450-48C6-AEA1-B444F87163D6}" type="presOf" srcId="{CA484139-D5E6-4582-BE84-DC71CC1A0BF3}" destId="{ABC0DC35-4025-4250-8E21-F2000B512F7A}" srcOrd="1" destOrd="0" presId="urn:microsoft.com/office/officeart/2005/8/layout/process1"/>
+    <dgm:cxn modelId="{8CF51921-B97C-4956-BBA4-8A22DC2CA7B4}" type="presOf" srcId="{2454D6AA-B5A6-46A5-911C-2D2D8002CE7B}" destId="{DF66BDFE-BC43-424F-8DF1-B69DD604C968}" srcOrd="0" destOrd="0" presId="urn:microsoft.com/office/officeart/2005/8/layout/process1"/>
+    <dgm:cxn modelId="{123A8657-9E45-4E31-BAF3-4B5D879AAC79}" srcId="{98ECDF51-0C2C-4BD4-A143-8260D47E5C7C}" destId="{2454D6AA-B5A6-46A5-911C-2D2D8002CE7B}" srcOrd="7" destOrd="0" parTransId="{8F4F9729-F9BE-4B17-B9C5-C30168297B78}" sibTransId="{B66951B2-912A-48ED-A006-C3EA92DADD6D}"/>
+    <dgm:cxn modelId="{F52F50CF-0B49-4B8D-A3EF-7CB663DEB1BB}" type="presOf" srcId="{98ECDF51-0C2C-4BD4-A143-8260D47E5C7C}" destId="{312D3483-BCAA-4CBA-BCCA-2C36623BC7E4}" srcOrd="0" destOrd="0" presId="urn:microsoft.com/office/officeart/2005/8/layout/process1"/>
+    <dgm:cxn modelId="{1A2EDF4E-5986-498F-8901-2E1869CC669D}" type="presOf" srcId="{D9A0E1B3-40F8-4A0B-B01C-448DDF255809}" destId="{0D00317D-1F9F-40CE-B93B-73D212302F9B}" srcOrd="0" destOrd="0" presId="urn:microsoft.com/office/officeart/2005/8/layout/process1"/>
+    <dgm:cxn modelId="{20E067CA-CEA5-4274-B107-C0E6FB67E4A9}" type="presOf" srcId="{01307C35-FB85-43CF-A4FB-8EBC20798E86}" destId="{494A9037-2260-4DE2-B595-D6E21AEEB7EC}" srcOrd="0" destOrd="0" presId="urn:microsoft.com/office/officeart/2005/8/layout/process1"/>
     <dgm:cxn modelId="{B5111309-F03D-434F-B70D-C1BD604236D7}" type="presOf" srcId="{C34E6AE6-1A28-427D-9DBB-F07182E0C601}" destId="{1C393F61-6B61-4A63-B37D-C67BF2BE5738}" srcOrd="1" destOrd="0" presId="urn:microsoft.com/office/officeart/2005/8/layout/process1"/>
     <dgm:cxn modelId="{BB59A154-9650-4C1A-AA77-A0D3FAF39345}" type="presOf" srcId="{61724E91-98A3-4459-8AA6-4A592E331E2E}" destId="{0606162D-BB47-4FE7-B341-F0D28A0C2475}" srcOrd="1" destOrd="0" presId="urn:microsoft.com/office/officeart/2005/8/layout/process1"/>
+    <dgm:cxn modelId="{C4E2AB11-E352-49CC-85F9-DB7440450E52}" type="presOf" srcId="{4274979B-230F-4246-951A-F22F78D69028}" destId="{AA2E9E5A-FE97-4F49-91E2-E59938094442}" srcOrd="1" destOrd="0" presId="urn:microsoft.com/office/officeart/2005/8/layout/process1"/>
+    <dgm:cxn modelId="{4B079DE6-C8CB-4F14-84F7-254E419BCAA4}" type="presOf" srcId="{CA484139-D5E6-4582-BE84-DC71CC1A0BF3}" destId="{96AC33B3-5D5E-4E22-AEF4-025C0C5DB44C}" srcOrd="0" destOrd="0" presId="urn:microsoft.com/office/officeart/2005/8/layout/process1"/>
+    <dgm:cxn modelId="{42A07278-EDAC-4EAC-BE31-B7CF9D1F3B0A}" srcId="{98ECDF51-0C2C-4BD4-A143-8260D47E5C7C}" destId="{2FE62AC5-280A-4A9B-9DBF-3BB514515D9B}" srcOrd="1" destOrd="0" parTransId="{71B66D58-60E2-4231-890F-C47B5D1B65D9}" sibTransId="{01307C35-FB85-43CF-A4FB-8EBC20798E86}"/>
     <dgm:cxn modelId="{ACF375BC-D7BF-4B63-8AA7-DF8D9DD30F4A}" srcId="{98ECDF51-0C2C-4BD4-A143-8260D47E5C7C}" destId="{E27B196C-DF3E-4D50-B5E4-B1C7AE834579}" srcOrd="5" destOrd="0" parTransId="{16E3689B-1DA3-48D8-856E-B4A17E5D5CBF}" sibTransId="{4274979B-230F-4246-951A-F22F78D69028}"/>
+    <dgm:cxn modelId="{AB3C4BCC-9050-402D-BFA8-10F71AA98E2C}" type="presOf" srcId="{A4BF13A6-808D-41AE-9F1A-B6DEFC4EFF73}" destId="{DE3C5F5A-F4C7-40C4-AEB3-A125514E4B40}" srcOrd="0" destOrd="0" presId="urn:microsoft.com/office/officeart/2005/8/layout/process1"/>
+    <dgm:cxn modelId="{13E4FB3E-E614-40CD-AC02-4BAF70653E8A}" type="presOf" srcId="{A4BF13A6-808D-41AE-9F1A-B6DEFC4EFF73}" destId="{ED580F5A-9777-4C1F-B514-4FFFBC518BF7}" srcOrd="1" destOrd="0" presId="urn:microsoft.com/office/officeart/2005/8/layout/process1"/>
+    <dgm:cxn modelId="{B32A4193-7607-4E67-BF54-1BDCC363FB86}" srcId="{98ECDF51-0C2C-4BD4-A143-8260D47E5C7C}" destId="{84C2AAA0-DC8C-486A-855B-4B9F4BACC51C}" srcOrd="6" destOrd="0" parTransId="{CBC2BB69-40DB-4472-8E24-9D613B67CDF1}" sibTransId="{CA484139-D5E6-4582-BE84-DC71CC1A0BF3}"/>
+    <dgm:cxn modelId="{ADA25F14-26B1-4025-B46B-CC38D10E7438}" type="presOf" srcId="{2FE62AC5-280A-4A9B-9DBF-3BB514515D9B}" destId="{973FA5A7-83FB-40F4-A2DB-45274D12C016}" srcOrd="0" destOrd="0" presId="urn:microsoft.com/office/officeart/2005/8/layout/process1"/>
+    <dgm:cxn modelId="{79519DB5-DD65-4692-9EEF-A24DF0D0DE3E}" type="presOf" srcId="{E27B196C-DF3E-4D50-B5E4-B1C7AE834579}" destId="{5CFB361A-E8FF-4A00-9A9E-218DD332A7C1}" srcOrd="0" destOrd="0" presId="urn:microsoft.com/office/officeart/2005/8/layout/process1"/>
+    <dgm:cxn modelId="{4261AD2E-815B-4FE3-8746-6515CE7B1025}" type="presOf" srcId="{01307C35-FB85-43CF-A4FB-8EBC20798E86}" destId="{73AA256C-7E13-430A-87A4-637839473AAB}" srcOrd="1" destOrd="0" presId="urn:microsoft.com/office/officeart/2005/8/layout/process1"/>
     <dgm:cxn modelId="{A4474718-88C8-419D-A096-EBAB64DB08A8}" srcId="{98ECDF51-0C2C-4BD4-A143-8260D47E5C7C}" destId="{8A4B13F2-E876-4462-8DE1-6FF39E81D27A}" srcOrd="0" destOrd="0" parTransId="{FC194A00-361F-4269-B3A6-278646EEEC45}" sibTransId="{D9A0E1B3-40F8-4A0B-B01C-448DDF255809}"/>
     <dgm:cxn modelId="{1B590C9E-2B57-44CC-B7BF-23D819921375}" type="presOf" srcId="{C34E6AE6-1A28-427D-9DBB-F07182E0C601}" destId="{25A125EA-4E1F-4A84-83A6-F7A10548526F}" srcOrd="0" destOrd="0" presId="urn:microsoft.com/office/officeart/2005/8/layout/process1"/>
-    <dgm:cxn modelId="{8CF51921-B97C-4956-BBA4-8A22DC2CA7B4}" type="presOf" srcId="{2454D6AA-B5A6-46A5-911C-2D2D8002CE7B}" destId="{DF66BDFE-BC43-424F-8DF1-B69DD604C968}" srcOrd="0" destOrd="0" presId="urn:microsoft.com/office/officeart/2005/8/layout/process1"/>
-    <dgm:cxn modelId="{1A2EDF4E-5986-498F-8901-2E1869CC669D}" type="presOf" srcId="{D9A0E1B3-40F8-4A0B-B01C-448DDF255809}" destId="{0D00317D-1F9F-40CE-B93B-73D212302F9B}" srcOrd="0" destOrd="0" presId="urn:microsoft.com/office/officeart/2005/8/layout/process1"/>
-    <dgm:cxn modelId="{B5EE4EE4-2C58-4676-8913-FE65080189C7}" type="presOf" srcId="{61724E91-98A3-4459-8AA6-4A592E331E2E}" destId="{AE9DB057-DB4E-4AE4-994F-597651176A96}" srcOrd="0" destOrd="0" presId="urn:microsoft.com/office/officeart/2005/8/layout/process1"/>
+    <dgm:cxn modelId="{27CCA62F-1B1F-40B3-8271-3B2783E39E3C}" type="presOf" srcId="{84C2AAA0-DC8C-486A-855B-4B9F4BACC51C}" destId="{E0CDA61B-FDA4-4FA5-A2F3-965314EC53FC}" srcOrd="0" destOrd="0" presId="urn:microsoft.com/office/officeart/2005/8/layout/process1"/>
     <dgm:cxn modelId="{E7731A05-D31D-4C3F-A04D-31386AB87B28}" type="presOf" srcId="{4274979B-230F-4246-951A-F22F78D69028}" destId="{AD6F85CF-E0A7-420D-B41E-B96673FC5338}" srcOrd="0" destOrd="0" presId="urn:microsoft.com/office/officeart/2005/8/layout/process1"/>
-    <dgm:cxn modelId="{42A07278-EDAC-4EAC-BE31-B7CF9D1F3B0A}" srcId="{98ECDF51-0C2C-4BD4-A143-8260D47E5C7C}" destId="{2FE62AC5-280A-4A9B-9DBF-3BB514515D9B}" srcOrd="1" destOrd="0" parTransId="{71B66D58-60E2-4231-890F-C47B5D1B65D9}" sibTransId="{01307C35-FB85-43CF-A4FB-8EBC20798E86}"/>
-    <dgm:cxn modelId="{B32A4193-7607-4E67-BF54-1BDCC363FB86}" srcId="{98ECDF51-0C2C-4BD4-A143-8260D47E5C7C}" destId="{84C2AAA0-DC8C-486A-855B-4B9F4BACC51C}" srcOrd="6" destOrd="0" parTransId="{CBC2BB69-40DB-4472-8E24-9D613B67CDF1}" sibTransId="{CA484139-D5E6-4582-BE84-DC71CC1A0BF3}"/>
-    <dgm:cxn modelId="{4261AD2E-815B-4FE3-8746-6515CE7B1025}" type="presOf" srcId="{01307C35-FB85-43CF-A4FB-8EBC20798E86}" destId="{73AA256C-7E13-430A-87A4-637839473AAB}" srcOrd="1" destOrd="0" presId="urn:microsoft.com/office/officeart/2005/8/layout/process1"/>
-    <dgm:cxn modelId="{C4E2AB11-E352-49CC-85F9-DB7440450E52}" type="presOf" srcId="{4274979B-230F-4246-951A-F22F78D69028}" destId="{AA2E9E5A-FE97-4F49-91E2-E59938094442}" srcOrd="1" destOrd="0" presId="urn:microsoft.com/office/officeart/2005/8/layout/process1"/>
-    <dgm:cxn modelId="{3801D387-3F57-4EFB-9B5C-AA95E92C17E7}" type="presOf" srcId="{088066A9-26DC-4DAD-9FD2-5DB4A495594E}" destId="{59098B63-7FED-408D-A813-C8982841BFA6}" srcOrd="0" destOrd="0" presId="urn:microsoft.com/office/officeart/2005/8/layout/process1"/>
-    <dgm:cxn modelId="{F52F50CF-0B49-4B8D-A3EF-7CB663DEB1BB}" type="presOf" srcId="{98ECDF51-0C2C-4BD4-A143-8260D47E5C7C}" destId="{312D3483-BCAA-4CBA-BCCA-2C36623BC7E4}" srcOrd="0" destOrd="0" presId="urn:microsoft.com/office/officeart/2005/8/layout/process1"/>
-    <dgm:cxn modelId="{AB3C4BCC-9050-402D-BFA8-10F71AA98E2C}" type="presOf" srcId="{A4BF13A6-808D-41AE-9F1A-B6DEFC4EFF73}" destId="{DE3C5F5A-F4C7-40C4-AEB3-A125514E4B40}" srcOrd="0" destOrd="0" presId="urn:microsoft.com/office/officeart/2005/8/layout/process1"/>
     <dgm:cxn modelId="{F4ED5A78-D189-427F-BB9C-2B03C2D3A715}" srcId="{98ECDF51-0C2C-4BD4-A143-8260D47E5C7C}" destId="{98797823-FAE4-4EA2-A04B-AD0B1991DD69}" srcOrd="4" destOrd="0" parTransId="{220898F2-FB86-40D5-8C0E-B03942E9E714}" sibTransId="{61724E91-98A3-4459-8AA6-4A592E331E2E}"/>
-    <dgm:cxn modelId="{123A8657-9E45-4E31-BAF3-4B5D879AAC79}" srcId="{98ECDF51-0C2C-4BD4-A143-8260D47E5C7C}" destId="{2454D6AA-B5A6-46A5-911C-2D2D8002CE7B}" srcOrd="7" destOrd="0" parTransId="{8F4F9729-F9BE-4B17-B9C5-C30168297B78}" sibTransId="{B66951B2-912A-48ED-A006-C3EA92DADD6D}"/>
-    <dgm:cxn modelId="{006CA85A-F381-44A4-851D-20C86D256A2D}" type="presOf" srcId="{D9A0E1B3-40F8-4A0B-B01C-448DDF255809}" destId="{6695DA87-83A0-495F-84F4-AB098357C1CA}" srcOrd="1" destOrd="0" presId="urn:microsoft.com/office/officeart/2005/8/layout/process1"/>
-    <dgm:cxn modelId="{27CCA62F-1B1F-40B3-8271-3B2783E39E3C}" type="presOf" srcId="{84C2AAA0-DC8C-486A-855B-4B9F4BACC51C}" destId="{E0CDA61B-FDA4-4FA5-A2F3-965314EC53FC}" srcOrd="0" destOrd="0" presId="urn:microsoft.com/office/officeart/2005/8/layout/process1"/>
-    <dgm:cxn modelId="{9B32E014-4450-48C6-AEA1-B444F87163D6}" type="presOf" srcId="{CA484139-D5E6-4582-BE84-DC71CC1A0BF3}" destId="{ABC0DC35-4025-4250-8E21-F2000B512F7A}" srcOrd="1" destOrd="0" presId="urn:microsoft.com/office/officeart/2005/8/layout/process1"/>
-    <dgm:cxn modelId="{F16A3988-F61B-4129-8594-9A95EA0A9CFC}" srcId="{98ECDF51-0C2C-4BD4-A143-8260D47E5C7C}" destId="{911C9649-F09F-4E47-949E-B8E423480905}" srcOrd="3" destOrd="0" parTransId="{47550EED-5170-458D-9D8D-F3A2DCCA1CF3}" sibTransId="{C34E6AE6-1A28-427D-9DBB-F07182E0C601}"/>
-    <dgm:cxn modelId="{20E067CA-CEA5-4274-B107-C0E6FB67E4A9}" type="presOf" srcId="{01307C35-FB85-43CF-A4FB-8EBC20798E86}" destId="{494A9037-2260-4DE2-B595-D6E21AEEB7EC}" srcOrd="0" destOrd="0" presId="urn:microsoft.com/office/officeart/2005/8/layout/process1"/>
-    <dgm:cxn modelId="{4CA25C0E-E814-44A5-ABC3-C30DE6715AAD}" type="presOf" srcId="{911C9649-F09F-4E47-949E-B8E423480905}" destId="{AC9308C5-0228-4EC0-9A80-03A61FB69966}" srcOrd="0" destOrd="0" presId="urn:microsoft.com/office/officeart/2005/8/layout/process1"/>
-    <dgm:cxn modelId="{4B079DE6-C8CB-4F14-84F7-254E419BCAA4}" type="presOf" srcId="{CA484139-D5E6-4582-BE84-DC71CC1A0BF3}" destId="{96AC33B3-5D5E-4E22-AEF4-025C0C5DB44C}" srcOrd="0" destOrd="0" presId="urn:microsoft.com/office/officeart/2005/8/layout/process1"/>
-    <dgm:cxn modelId="{79519DB5-DD65-4692-9EEF-A24DF0D0DE3E}" type="presOf" srcId="{E27B196C-DF3E-4D50-B5E4-B1C7AE834579}" destId="{5CFB361A-E8FF-4A00-9A9E-218DD332A7C1}" srcOrd="0" destOrd="0" presId="urn:microsoft.com/office/officeart/2005/8/layout/process1"/>
     <dgm:cxn modelId="{3A5573A8-D0DF-4CF4-A9E2-B81D71737CCB}" srcId="{98ECDF51-0C2C-4BD4-A143-8260D47E5C7C}" destId="{088066A9-26DC-4DAD-9FD2-5DB4A495594E}" srcOrd="2" destOrd="0" parTransId="{8000FB17-1030-420F-9AFB-26B9B96E696E}" sibTransId="{A4BF13A6-808D-41AE-9F1A-B6DEFC4EFF73}"/>
-    <dgm:cxn modelId="{ADA25F14-26B1-4025-B46B-CC38D10E7438}" type="presOf" srcId="{2FE62AC5-280A-4A9B-9DBF-3BB514515D9B}" destId="{973FA5A7-83FB-40F4-A2DB-45274D12C016}" srcOrd="0" destOrd="0" presId="urn:microsoft.com/office/officeart/2005/8/layout/process1"/>
+    <dgm:cxn modelId="{6EEBE262-FA83-469E-A2C4-32F79C6A83CD}" type="presOf" srcId="{8A4B13F2-E876-4462-8DE1-6FF39E81D27A}" destId="{4E3A8CC7-6599-47F6-882D-C999A174994A}" srcOrd="0" destOrd="0" presId="urn:microsoft.com/office/officeart/2005/8/layout/process1"/>
     <dgm:cxn modelId="{824D9F05-ABDC-428F-A050-FF02C94B0C01}" type="presParOf" srcId="{312D3483-BCAA-4CBA-BCCA-2C36623BC7E4}" destId="{4E3A8CC7-6599-47F6-882D-C999A174994A}" srcOrd="0" destOrd="0" presId="urn:microsoft.com/office/officeart/2005/8/layout/process1"/>
     <dgm:cxn modelId="{FD1CCCB4-F6ED-4C70-865B-457C8170DB55}" type="presParOf" srcId="{312D3483-BCAA-4CBA-BCCA-2C36623BC7E4}" destId="{0D00317D-1F9F-40CE-B93B-73D212302F9B}" srcOrd="1" destOrd="0" presId="urn:microsoft.com/office/officeart/2005/8/layout/process1"/>
     <dgm:cxn modelId="{2EB97081-08B4-449D-8518-0857817010E6}" type="presParOf" srcId="{0D00317D-1F9F-40CE-B93B-73D212302F9B}" destId="{6695DA87-83A0-495F-84F4-AB098357C1CA}" srcOrd="0" destOrd="0" presId="urn:microsoft.com/office/officeart/2005/8/layout/process1"/>
@@ -1439,1129 +1540,6 @@
       <dsp:cNvGrpSpPr/>
     </dsp:nvGrpSpPr>
     <dsp:grpSpPr/>
-    <dsp:sp modelId="{4E3A8CC7-6599-47F6-882D-C999A174994A}">
-      <dsp:nvSpPr>
-        <dsp:cNvPr id="0" name=""/>
-        <dsp:cNvSpPr/>
-      </dsp:nvSpPr>
-      <dsp:spPr>
-        <a:xfrm>
-          <a:off x="3943" y="2121893"/>
-          <a:ext cx="1067435" cy="1511088"/>
-        </a:xfrm>
-        <a:prstGeom prst="roundRect">
-          <a:avLst>
-            <a:gd name="adj" fmla="val 10000"/>
-          </a:avLst>
-        </a:prstGeom>
-        <a:solidFill>
-          <a:schemeClr val="accent1">
-            <a:hueOff val="0"/>
-            <a:satOff val="0"/>
-            <a:lumOff val="0"/>
-            <a:alphaOff val="0"/>
-          </a:schemeClr>
-        </a:solidFill>
-        <a:ln w="15875" cap="flat" cmpd="sng" algn="ctr">
-          <a:solidFill>
-            <a:schemeClr val="lt1">
-              <a:hueOff val="0"/>
-              <a:satOff val="0"/>
-              <a:lumOff val="0"/>
-              <a:alphaOff val="0"/>
-            </a:schemeClr>
-          </a:solidFill>
-          <a:prstDash val="solid"/>
-        </a:ln>
-        <a:effectLst/>
-      </dsp:spPr>
-      <dsp:style>
-        <a:lnRef idx="2">
-          <a:scrgbClr r="0" g="0" b="0"/>
-        </a:lnRef>
-        <a:fillRef idx="1">
-          <a:scrgbClr r="0" g="0" b="0"/>
-        </a:fillRef>
-        <a:effectRef idx="0">
-          <a:scrgbClr r="0" g="0" b="0"/>
-        </a:effectRef>
-        <a:fontRef idx="minor">
-          <a:schemeClr val="lt1"/>
-        </a:fontRef>
-      </dsp:style>
-      <dsp:txBody>
-        <a:bodyPr spcFirstLastPara="0" vert="horz" wrap="square" lIns="45720" tIns="45720" rIns="45720" bIns="45720" numCol="1" spcCol="1270" anchor="ctr" anchorCtr="0">
-          <a:noAutofit/>
-        </a:bodyPr>
-        <a:lstStyle/>
-        <a:p>
-          <a:pPr lvl="0" algn="ctr" defTabSz="533400">
-            <a:lnSpc>
-              <a:spcPct val="90000"/>
-            </a:lnSpc>
-            <a:spcBef>
-              <a:spcPct val="0"/>
-            </a:spcBef>
-            <a:spcAft>
-              <a:spcPct val="35000"/>
-            </a:spcAft>
-          </a:pPr>
-          <a:r>
-            <a:rPr lang="pt-BR" sz="1200" kern="1200" dirty="0" smtClean="0"/>
-            <a:t>Mapear atividades –Mapa de Processo detalhado de uma forma de contratação crítica</a:t>
-          </a:r>
-          <a:endParaRPr lang="en-US" sz="1200" kern="1200" dirty="0"/>
-        </a:p>
-      </dsp:txBody>
-      <dsp:txXfrm>
-        <a:off x="35207" y="2153157"/>
-        <a:ext cx="1004907" cy="1448560"/>
-      </dsp:txXfrm>
-    </dsp:sp>
-    <dsp:sp modelId="{0D00317D-1F9F-40CE-B93B-73D212302F9B}">
-      <dsp:nvSpPr>
-        <dsp:cNvPr id="0" name=""/>
-        <dsp:cNvSpPr/>
-      </dsp:nvSpPr>
-      <dsp:spPr>
-        <a:xfrm>
-          <a:off x="1178122" y="2745076"/>
-          <a:ext cx="226296" cy="264723"/>
-        </a:xfrm>
-        <a:prstGeom prst="rightArrow">
-          <a:avLst>
-            <a:gd name="adj1" fmla="val 60000"/>
-            <a:gd name="adj2" fmla="val 50000"/>
-          </a:avLst>
-        </a:prstGeom>
-        <a:solidFill>
-          <a:schemeClr val="accent1">
-            <a:tint val="60000"/>
-            <a:hueOff val="0"/>
-            <a:satOff val="0"/>
-            <a:lumOff val="0"/>
-            <a:alphaOff val="0"/>
-          </a:schemeClr>
-        </a:solidFill>
-        <a:ln>
-          <a:noFill/>
-        </a:ln>
-        <a:effectLst/>
-      </dsp:spPr>
-      <dsp:style>
-        <a:lnRef idx="0">
-          <a:scrgbClr r="0" g="0" b="0"/>
-        </a:lnRef>
-        <a:fillRef idx="1">
-          <a:scrgbClr r="0" g="0" b="0"/>
-        </a:fillRef>
-        <a:effectRef idx="0">
-          <a:scrgbClr r="0" g="0" b="0"/>
-        </a:effectRef>
-        <a:fontRef idx="minor">
-          <a:schemeClr val="lt1"/>
-        </a:fontRef>
-      </dsp:style>
-      <dsp:txBody>
-        <a:bodyPr spcFirstLastPara="0" vert="horz" wrap="square" lIns="0" tIns="0" rIns="0" bIns="0" numCol="1" spcCol="1270" anchor="ctr" anchorCtr="0">
-          <a:noAutofit/>
-        </a:bodyPr>
-        <a:lstStyle/>
-        <a:p>
-          <a:pPr lvl="0" algn="ctr" defTabSz="444500">
-            <a:lnSpc>
-              <a:spcPct val="90000"/>
-            </a:lnSpc>
-            <a:spcBef>
-              <a:spcPct val="0"/>
-            </a:spcBef>
-            <a:spcAft>
-              <a:spcPct val="35000"/>
-            </a:spcAft>
-          </a:pPr>
-          <a:endParaRPr lang="en-US" sz="1000" kern="1200"/>
-        </a:p>
-      </dsp:txBody>
-      <dsp:txXfrm>
-        <a:off x="1178122" y="2798021"/>
-        <a:ext cx="158407" cy="158833"/>
-      </dsp:txXfrm>
-    </dsp:sp>
-    <dsp:sp modelId="{973FA5A7-83FB-40F4-A2DB-45274D12C016}">
-      <dsp:nvSpPr>
-        <dsp:cNvPr id="0" name=""/>
-        <dsp:cNvSpPr/>
-      </dsp:nvSpPr>
-      <dsp:spPr>
-        <a:xfrm>
-          <a:off x="1498352" y="2121893"/>
-          <a:ext cx="1067435" cy="1511088"/>
-        </a:xfrm>
-        <a:prstGeom prst="roundRect">
-          <a:avLst>
-            <a:gd name="adj" fmla="val 10000"/>
-          </a:avLst>
-        </a:prstGeom>
-        <a:solidFill>
-          <a:schemeClr val="accent1">
-            <a:hueOff val="0"/>
-            <a:satOff val="0"/>
-            <a:lumOff val="0"/>
-            <a:alphaOff val="0"/>
-          </a:schemeClr>
-        </a:solidFill>
-        <a:ln w="15875" cap="flat" cmpd="sng" algn="ctr">
-          <a:solidFill>
-            <a:schemeClr val="lt1">
-              <a:hueOff val="0"/>
-              <a:satOff val="0"/>
-              <a:lumOff val="0"/>
-              <a:alphaOff val="0"/>
-            </a:schemeClr>
-          </a:solidFill>
-          <a:prstDash val="solid"/>
-        </a:ln>
-        <a:effectLst/>
-      </dsp:spPr>
-      <dsp:style>
-        <a:lnRef idx="2">
-          <a:scrgbClr r="0" g="0" b="0"/>
-        </a:lnRef>
-        <a:fillRef idx="1">
-          <a:scrgbClr r="0" g="0" b="0"/>
-        </a:fillRef>
-        <a:effectRef idx="0">
-          <a:scrgbClr r="0" g="0" b="0"/>
-        </a:effectRef>
-        <a:fontRef idx="minor">
-          <a:schemeClr val="lt1"/>
-        </a:fontRef>
-      </dsp:style>
-      <dsp:txBody>
-        <a:bodyPr spcFirstLastPara="0" vert="horz" wrap="square" lIns="45720" tIns="45720" rIns="45720" bIns="45720" numCol="1" spcCol="1270" anchor="ctr" anchorCtr="0">
-          <a:noAutofit/>
-        </a:bodyPr>
-        <a:lstStyle/>
-        <a:p>
-          <a:pPr lvl="0" algn="ctr" defTabSz="533400">
-            <a:lnSpc>
-              <a:spcPct val="90000"/>
-            </a:lnSpc>
-            <a:spcBef>
-              <a:spcPct val="0"/>
-            </a:spcBef>
-            <a:spcAft>
-              <a:spcPct val="35000"/>
-            </a:spcAft>
-          </a:pPr>
-          <a:r>
-            <a:rPr lang="pt-BR" sz="1200" kern="1200" dirty="0" smtClean="0"/>
-            <a:t>Identificar algum PAD crítico para mapear</a:t>
-          </a:r>
-          <a:endParaRPr lang="en-US" sz="1200" kern="1200" dirty="0"/>
-        </a:p>
-      </dsp:txBody>
-      <dsp:txXfrm>
-        <a:off x="1529616" y="2153157"/>
-        <a:ext cx="1004907" cy="1448560"/>
-      </dsp:txXfrm>
-    </dsp:sp>
-    <dsp:sp modelId="{494A9037-2260-4DE2-B595-D6E21AEEB7EC}">
-      <dsp:nvSpPr>
-        <dsp:cNvPr id="0" name=""/>
-        <dsp:cNvSpPr/>
-      </dsp:nvSpPr>
-      <dsp:spPr>
-        <a:xfrm>
-          <a:off x="2672531" y="2745076"/>
-          <a:ext cx="226296" cy="264723"/>
-        </a:xfrm>
-        <a:prstGeom prst="rightArrow">
-          <a:avLst>
-            <a:gd name="adj1" fmla="val 60000"/>
-            <a:gd name="adj2" fmla="val 50000"/>
-          </a:avLst>
-        </a:prstGeom>
-        <a:solidFill>
-          <a:schemeClr val="accent1">
-            <a:tint val="60000"/>
-            <a:hueOff val="0"/>
-            <a:satOff val="0"/>
-            <a:lumOff val="0"/>
-            <a:alphaOff val="0"/>
-          </a:schemeClr>
-        </a:solidFill>
-        <a:ln>
-          <a:noFill/>
-        </a:ln>
-        <a:effectLst/>
-      </dsp:spPr>
-      <dsp:style>
-        <a:lnRef idx="0">
-          <a:scrgbClr r="0" g="0" b="0"/>
-        </a:lnRef>
-        <a:fillRef idx="1">
-          <a:scrgbClr r="0" g="0" b="0"/>
-        </a:fillRef>
-        <a:effectRef idx="0">
-          <a:scrgbClr r="0" g="0" b="0"/>
-        </a:effectRef>
-        <a:fontRef idx="minor">
-          <a:schemeClr val="lt1"/>
-        </a:fontRef>
-      </dsp:style>
-      <dsp:txBody>
-        <a:bodyPr spcFirstLastPara="0" vert="horz" wrap="square" lIns="0" tIns="0" rIns="0" bIns="0" numCol="1" spcCol="1270" anchor="ctr" anchorCtr="0">
-          <a:noAutofit/>
-        </a:bodyPr>
-        <a:lstStyle/>
-        <a:p>
-          <a:pPr lvl="0" algn="ctr" defTabSz="444500">
-            <a:lnSpc>
-              <a:spcPct val="90000"/>
-            </a:lnSpc>
-            <a:spcBef>
-              <a:spcPct val="0"/>
-            </a:spcBef>
-            <a:spcAft>
-              <a:spcPct val="35000"/>
-            </a:spcAft>
-          </a:pPr>
-          <a:endParaRPr lang="en-US" sz="1000" kern="1200"/>
-        </a:p>
-      </dsp:txBody>
-      <dsp:txXfrm>
-        <a:off x="2672531" y="2798021"/>
-        <a:ext cx="158407" cy="158833"/>
-      </dsp:txXfrm>
-    </dsp:sp>
-    <dsp:sp modelId="{59098B63-7FED-408D-A813-C8982841BFA6}">
-      <dsp:nvSpPr>
-        <dsp:cNvPr id="0" name=""/>
-        <dsp:cNvSpPr/>
-      </dsp:nvSpPr>
-      <dsp:spPr>
-        <a:xfrm>
-          <a:off x="2992762" y="2121893"/>
-          <a:ext cx="1067435" cy="1511088"/>
-        </a:xfrm>
-        <a:prstGeom prst="roundRect">
-          <a:avLst>
-            <a:gd name="adj" fmla="val 10000"/>
-          </a:avLst>
-        </a:prstGeom>
-        <a:solidFill>
-          <a:schemeClr val="accent1">
-            <a:hueOff val="0"/>
-            <a:satOff val="0"/>
-            <a:lumOff val="0"/>
-            <a:alphaOff val="0"/>
-          </a:schemeClr>
-        </a:solidFill>
-        <a:ln w="15875" cap="flat" cmpd="sng" algn="ctr">
-          <a:solidFill>
-            <a:schemeClr val="lt1">
-              <a:hueOff val="0"/>
-              <a:satOff val="0"/>
-              <a:lumOff val="0"/>
-              <a:alphaOff val="0"/>
-            </a:schemeClr>
-          </a:solidFill>
-          <a:prstDash val="solid"/>
-        </a:ln>
-        <a:effectLst/>
-      </dsp:spPr>
-      <dsp:style>
-        <a:lnRef idx="2">
-          <a:scrgbClr r="0" g="0" b="0"/>
-        </a:lnRef>
-        <a:fillRef idx="1">
-          <a:scrgbClr r="0" g="0" b="0"/>
-        </a:fillRef>
-        <a:effectRef idx="0">
-          <a:scrgbClr r="0" g="0" b="0"/>
-        </a:effectRef>
-        <a:fontRef idx="minor">
-          <a:schemeClr val="lt1"/>
-        </a:fontRef>
-      </dsp:style>
-      <dsp:txBody>
-        <a:bodyPr spcFirstLastPara="0" vert="horz" wrap="square" lIns="45720" tIns="45720" rIns="45720" bIns="45720" numCol="1" spcCol="1270" anchor="ctr" anchorCtr="0">
-          <a:noAutofit/>
-        </a:bodyPr>
-        <a:lstStyle/>
-        <a:p>
-          <a:pPr lvl="0" algn="ctr" defTabSz="533400">
-            <a:lnSpc>
-              <a:spcPct val="90000"/>
-            </a:lnSpc>
-            <a:spcBef>
-              <a:spcPct val="0"/>
-            </a:spcBef>
-            <a:spcAft>
-              <a:spcPct val="35000"/>
-            </a:spcAft>
-          </a:pPr>
-          <a:r>
-            <a:rPr lang="pt-BR" sz="1200" kern="1200" dirty="0" smtClean="0"/>
-            <a:t>Extrair no formato adotado no Banco de Dados</a:t>
-          </a:r>
-          <a:endParaRPr lang="en-US" sz="1200" kern="1200" dirty="0"/>
-        </a:p>
-      </dsp:txBody>
-      <dsp:txXfrm>
-        <a:off x="3024026" y="2153157"/>
-        <a:ext cx="1004907" cy="1448560"/>
-      </dsp:txXfrm>
-    </dsp:sp>
-    <dsp:sp modelId="{DE3C5F5A-F4C7-40C4-AEB3-A125514E4B40}">
-      <dsp:nvSpPr>
-        <dsp:cNvPr id="0" name=""/>
-        <dsp:cNvSpPr/>
-      </dsp:nvSpPr>
-      <dsp:spPr>
-        <a:xfrm>
-          <a:off x="4166941" y="2745076"/>
-          <a:ext cx="226296" cy="264723"/>
-        </a:xfrm>
-        <a:prstGeom prst="rightArrow">
-          <a:avLst>
-            <a:gd name="adj1" fmla="val 60000"/>
-            <a:gd name="adj2" fmla="val 50000"/>
-          </a:avLst>
-        </a:prstGeom>
-        <a:solidFill>
-          <a:schemeClr val="accent1">
-            <a:tint val="60000"/>
-            <a:hueOff val="0"/>
-            <a:satOff val="0"/>
-            <a:lumOff val="0"/>
-            <a:alphaOff val="0"/>
-          </a:schemeClr>
-        </a:solidFill>
-        <a:ln>
-          <a:noFill/>
-        </a:ln>
-        <a:effectLst/>
-      </dsp:spPr>
-      <dsp:style>
-        <a:lnRef idx="0">
-          <a:scrgbClr r="0" g="0" b="0"/>
-        </a:lnRef>
-        <a:fillRef idx="1">
-          <a:scrgbClr r="0" g="0" b="0"/>
-        </a:fillRef>
-        <a:effectRef idx="0">
-          <a:scrgbClr r="0" g="0" b="0"/>
-        </a:effectRef>
-        <a:fontRef idx="minor">
-          <a:schemeClr val="lt1"/>
-        </a:fontRef>
-      </dsp:style>
-      <dsp:txBody>
-        <a:bodyPr spcFirstLastPara="0" vert="horz" wrap="square" lIns="0" tIns="0" rIns="0" bIns="0" numCol="1" spcCol="1270" anchor="ctr" anchorCtr="0">
-          <a:noAutofit/>
-        </a:bodyPr>
-        <a:lstStyle/>
-        <a:p>
-          <a:pPr lvl="0" algn="ctr" defTabSz="444500">
-            <a:lnSpc>
-              <a:spcPct val="90000"/>
-            </a:lnSpc>
-            <a:spcBef>
-              <a:spcPct val="0"/>
-            </a:spcBef>
-            <a:spcAft>
-              <a:spcPct val="35000"/>
-            </a:spcAft>
-          </a:pPr>
-          <a:endParaRPr lang="en-US" sz="1000" kern="1200"/>
-        </a:p>
-      </dsp:txBody>
-      <dsp:txXfrm>
-        <a:off x="4166941" y="2798021"/>
-        <a:ext cx="158407" cy="158833"/>
-      </dsp:txXfrm>
-    </dsp:sp>
-    <dsp:sp modelId="{AC9308C5-0228-4EC0-9A80-03A61FB69966}">
-      <dsp:nvSpPr>
-        <dsp:cNvPr id="0" name=""/>
-        <dsp:cNvSpPr/>
-      </dsp:nvSpPr>
-      <dsp:spPr>
-        <a:xfrm>
-          <a:off x="4487171" y="2121893"/>
-          <a:ext cx="1067435" cy="1511088"/>
-        </a:xfrm>
-        <a:prstGeom prst="roundRect">
-          <a:avLst>
-            <a:gd name="adj" fmla="val 10000"/>
-          </a:avLst>
-        </a:prstGeom>
-        <a:solidFill>
-          <a:schemeClr val="accent1">
-            <a:hueOff val="0"/>
-            <a:satOff val="0"/>
-            <a:lumOff val="0"/>
-            <a:alphaOff val="0"/>
-          </a:schemeClr>
-        </a:solidFill>
-        <a:ln w="15875" cap="flat" cmpd="sng" algn="ctr">
-          <a:solidFill>
-            <a:schemeClr val="lt1">
-              <a:hueOff val="0"/>
-              <a:satOff val="0"/>
-              <a:lumOff val="0"/>
-              <a:alphaOff val="0"/>
-            </a:schemeClr>
-          </a:solidFill>
-          <a:prstDash val="solid"/>
-        </a:ln>
-        <a:effectLst/>
-      </dsp:spPr>
-      <dsp:style>
-        <a:lnRef idx="2">
-          <a:scrgbClr r="0" g="0" b="0"/>
-        </a:lnRef>
-        <a:fillRef idx="1">
-          <a:scrgbClr r="0" g="0" b="0"/>
-        </a:fillRef>
-        <a:effectRef idx="0">
-          <a:scrgbClr r="0" g="0" b="0"/>
-        </a:effectRef>
-        <a:fontRef idx="minor">
-          <a:schemeClr val="lt1"/>
-        </a:fontRef>
-      </dsp:style>
-      <dsp:txBody>
-        <a:bodyPr spcFirstLastPara="0" vert="horz" wrap="square" lIns="45720" tIns="45720" rIns="45720" bIns="45720" numCol="1" spcCol="1270" anchor="ctr" anchorCtr="0">
-          <a:noAutofit/>
-        </a:bodyPr>
-        <a:lstStyle/>
-        <a:p>
-          <a:pPr lvl="0" algn="ctr" defTabSz="533400">
-            <a:lnSpc>
-              <a:spcPct val="90000"/>
-            </a:lnSpc>
-            <a:spcBef>
-              <a:spcPct val="0"/>
-            </a:spcBef>
-            <a:spcAft>
-              <a:spcPct val="35000"/>
-            </a:spcAft>
-          </a:pPr>
-          <a:r>
-            <a:rPr lang="pt-BR" sz="1200" kern="1200" dirty="0" smtClean="0"/>
-            <a:t>Rastrear tarefas do mapa de processo com cada trâmite relevante</a:t>
-          </a:r>
-          <a:endParaRPr lang="en-US" sz="1200" kern="1200" dirty="0"/>
-        </a:p>
-      </dsp:txBody>
-      <dsp:txXfrm>
-        <a:off x="4518435" y="2153157"/>
-        <a:ext cx="1004907" cy="1448560"/>
-      </dsp:txXfrm>
-    </dsp:sp>
-    <dsp:sp modelId="{25A125EA-4E1F-4A84-83A6-F7A10548526F}">
-      <dsp:nvSpPr>
-        <dsp:cNvPr id="0" name=""/>
-        <dsp:cNvSpPr/>
-      </dsp:nvSpPr>
-      <dsp:spPr>
-        <a:xfrm>
-          <a:off x="5661350" y="2745076"/>
-          <a:ext cx="226296" cy="264723"/>
-        </a:xfrm>
-        <a:prstGeom prst="rightArrow">
-          <a:avLst>
-            <a:gd name="adj1" fmla="val 60000"/>
-            <a:gd name="adj2" fmla="val 50000"/>
-          </a:avLst>
-        </a:prstGeom>
-        <a:solidFill>
-          <a:schemeClr val="accent1">
-            <a:tint val="60000"/>
-            <a:hueOff val="0"/>
-            <a:satOff val="0"/>
-            <a:lumOff val="0"/>
-            <a:alphaOff val="0"/>
-          </a:schemeClr>
-        </a:solidFill>
-        <a:ln>
-          <a:noFill/>
-        </a:ln>
-        <a:effectLst/>
-      </dsp:spPr>
-      <dsp:style>
-        <a:lnRef idx="0">
-          <a:scrgbClr r="0" g="0" b="0"/>
-        </a:lnRef>
-        <a:fillRef idx="1">
-          <a:scrgbClr r="0" g="0" b="0"/>
-        </a:fillRef>
-        <a:effectRef idx="0">
-          <a:scrgbClr r="0" g="0" b="0"/>
-        </a:effectRef>
-        <a:fontRef idx="minor">
-          <a:schemeClr val="lt1"/>
-        </a:fontRef>
-      </dsp:style>
-      <dsp:txBody>
-        <a:bodyPr spcFirstLastPara="0" vert="horz" wrap="square" lIns="0" tIns="0" rIns="0" bIns="0" numCol="1" spcCol="1270" anchor="ctr" anchorCtr="0">
-          <a:noAutofit/>
-        </a:bodyPr>
-        <a:lstStyle/>
-        <a:p>
-          <a:pPr lvl="0" algn="ctr" defTabSz="444500">
-            <a:lnSpc>
-              <a:spcPct val="90000"/>
-            </a:lnSpc>
-            <a:spcBef>
-              <a:spcPct val="0"/>
-            </a:spcBef>
-            <a:spcAft>
-              <a:spcPct val="35000"/>
-            </a:spcAft>
-          </a:pPr>
-          <a:endParaRPr lang="en-US" sz="1000" kern="1200"/>
-        </a:p>
-      </dsp:txBody>
-      <dsp:txXfrm>
-        <a:off x="5661350" y="2798021"/>
-        <a:ext cx="158407" cy="158833"/>
-      </dsp:txXfrm>
-    </dsp:sp>
-    <dsp:sp modelId="{E1BD6FF4-D542-42EA-B09D-40572FCB24DB}">
-      <dsp:nvSpPr>
-        <dsp:cNvPr id="0" name=""/>
-        <dsp:cNvSpPr/>
-      </dsp:nvSpPr>
-      <dsp:spPr>
-        <a:xfrm>
-          <a:off x="5981581" y="2121893"/>
-          <a:ext cx="1067435" cy="1511088"/>
-        </a:xfrm>
-        <a:prstGeom prst="roundRect">
-          <a:avLst>
-            <a:gd name="adj" fmla="val 10000"/>
-          </a:avLst>
-        </a:prstGeom>
-        <a:solidFill>
-          <a:schemeClr val="accent1">
-            <a:hueOff val="0"/>
-            <a:satOff val="0"/>
-            <a:lumOff val="0"/>
-            <a:alphaOff val="0"/>
-          </a:schemeClr>
-        </a:solidFill>
-        <a:ln w="15875" cap="flat" cmpd="sng" algn="ctr">
-          <a:solidFill>
-            <a:schemeClr val="lt1">
-              <a:hueOff val="0"/>
-              <a:satOff val="0"/>
-              <a:lumOff val="0"/>
-              <a:alphaOff val="0"/>
-            </a:schemeClr>
-          </a:solidFill>
-          <a:prstDash val="solid"/>
-        </a:ln>
-        <a:effectLst/>
-      </dsp:spPr>
-      <dsp:style>
-        <a:lnRef idx="2">
-          <a:scrgbClr r="0" g="0" b="0"/>
-        </a:lnRef>
-        <a:fillRef idx="1">
-          <a:scrgbClr r="0" g="0" b="0"/>
-        </a:fillRef>
-        <a:effectRef idx="0">
-          <a:scrgbClr r="0" g="0" b="0"/>
-        </a:effectRef>
-        <a:fontRef idx="minor">
-          <a:schemeClr val="lt1"/>
-        </a:fontRef>
-      </dsp:style>
-      <dsp:txBody>
-        <a:bodyPr spcFirstLastPara="0" vert="horz" wrap="square" lIns="45720" tIns="45720" rIns="45720" bIns="45720" numCol="1" spcCol="1270" anchor="ctr" anchorCtr="0">
-          <a:noAutofit/>
-        </a:bodyPr>
-        <a:lstStyle/>
-        <a:p>
-          <a:pPr lvl="0" algn="ctr" defTabSz="533400">
-            <a:lnSpc>
-              <a:spcPct val="90000"/>
-            </a:lnSpc>
-            <a:spcBef>
-              <a:spcPct val="0"/>
-            </a:spcBef>
-            <a:spcAft>
-              <a:spcPct val="35000"/>
-            </a:spcAft>
-          </a:pPr>
-          <a:r>
-            <a:rPr lang="pt-BR" sz="1200" kern="1200" dirty="0" smtClean="0"/>
-            <a:t>Calcular Lead Time , </a:t>
-          </a:r>
-          <a:r>
-            <a:rPr lang="pt-BR" sz="1200" kern="1200" dirty="0" err="1" smtClean="0"/>
-            <a:t>Cycle</a:t>
-          </a:r>
-          <a:r>
-            <a:rPr lang="pt-BR" sz="1200" kern="1200" dirty="0" smtClean="0"/>
-            <a:t> Time , Valor agregado e não agregado</a:t>
-          </a:r>
-          <a:endParaRPr lang="en-US" sz="1200" kern="1200" dirty="0"/>
-        </a:p>
-      </dsp:txBody>
-      <dsp:txXfrm>
-        <a:off x="6012845" y="2153157"/>
-        <a:ext cx="1004907" cy="1448560"/>
-      </dsp:txXfrm>
-    </dsp:sp>
-    <dsp:sp modelId="{AE9DB057-DB4E-4AE4-994F-597651176A96}">
-      <dsp:nvSpPr>
-        <dsp:cNvPr id="0" name=""/>
-        <dsp:cNvSpPr/>
-      </dsp:nvSpPr>
-      <dsp:spPr>
-        <a:xfrm rot="6354365">
-          <a:off x="6042040" y="3815185"/>
-          <a:ext cx="336615" cy="264723"/>
-        </a:xfrm>
-        <a:prstGeom prst="rightArrow">
-          <a:avLst>
-            <a:gd name="adj1" fmla="val 60000"/>
-            <a:gd name="adj2" fmla="val 50000"/>
-          </a:avLst>
-        </a:prstGeom>
-        <a:solidFill>
-          <a:schemeClr val="accent1">
-            <a:tint val="60000"/>
-            <a:hueOff val="0"/>
-            <a:satOff val="0"/>
-            <a:lumOff val="0"/>
-            <a:alphaOff val="0"/>
-          </a:schemeClr>
-        </a:solidFill>
-        <a:ln>
-          <a:noFill/>
-        </a:ln>
-        <a:effectLst/>
-      </dsp:spPr>
-      <dsp:style>
-        <a:lnRef idx="0">
-          <a:scrgbClr r="0" g="0" b="0"/>
-        </a:lnRef>
-        <a:fillRef idx="1">
-          <a:scrgbClr r="0" g="0" b="0"/>
-        </a:fillRef>
-        <a:effectRef idx="0">
-          <a:scrgbClr r="0" g="0" b="0"/>
-        </a:effectRef>
-        <a:fontRef idx="minor">
-          <a:schemeClr val="lt1"/>
-        </a:fontRef>
-      </dsp:style>
-      <dsp:txBody>
-        <a:bodyPr spcFirstLastPara="0" vert="horz" wrap="square" lIns="0" tIns="0" rIns="0" bIns="0" numCol="1" spcCol="1270" anchor="ctr" anchorCtr="0">
-          <a:noAutofit/>
-        </a:bodyPr>
-        <a:lstStyle/>
-        <a:p>
-          <a:pPr lvl="0" algn="ctr" defTabSz="444500">
-            <a:lnSpc>
-              <a:spcPct val="90000"/>
-            </a:lnSpc>
-            <a:spcBef>
-              <a:spcPct val="0"/>
-            </a:spcBef>
-            <a:spcAft>
-              <a:spcPct val="35000"/>
-            </a:spcAft>
-          </a:pPr>
-          <a:endParaRPr lang="en-US" sz="1000" kern="1200"/>
-        </a:p>
-      </dsp:txBody>
-      <dsp:txXfrm rot="10800000">
-        <a:off x="6092631" y="3829942"/>
-        <a:ext cx="257198" cy="158833"/>
-      </dsp:txXfrm>
-    </dsp:sp>
-    <dsp:sp modelId="{5CFB361A-E8FF-4A00-9A9E-218DD332A7C1}">
-      <dsp:nvSpPr>
-        <dsp:cNvPr id="0" name=""/>
-        <dsp:cNvSpPr/>
-      </dsp:nvSpPr>
-      <dsp:spPr>
-        <a:xfrm>
-          <a:off x="5376900" y="4243787"/>
-          <a:ext cx="1067435" cy="1511088"/>
-        </a:xfrm>
-        <a:prstGeom prst="roundRect">
-          <a:avLst>
-            <a:gd name="adj" fmla="val 10000"/>
-          </a:avLst>
-        </a:prstGeom>
-        <a:solidFill>
-          <a:schemeClr val="accent1">
-            <a:hueOff val="0"/>
-            <a:satOff val="0"/>
-            <a:lumOff val="0"/>
-            <a:alphaOff val="0"/>
-          </a:schemeClr>
-        </a:solidFill>
-        <a:ln w="15875" cap="flat" cmpd="sng" algn="ctr">
-          <a:solidFill>
-            <a:schemeClr val="lt1">
-              <a:hueOff val="0"/>
-              <a:satOff val="0"/>
-              <a:lumOff val="0"/>
-              <a:alphaOff val="0"/>
-            </a:schemeClr>
-          </a:solidFill>
-          <a:prstDash val="solid"/>
-        </a:ln>
-        <a:effectLst/>
-      </dsp:spPr>
-      <dsp:style>
-        <a:lnRef idx="2">
-          <a:scrgbClr r="0" g="0" b="0"/>
-        </a:lnRef>
-        <a:fillRef idx="1">
-          <a:scrgbClr r="0" g="0" b="0"/>
-        </a:fillRef>
-        <a:effectRef idx="0">
-          <a:scrgbClr r="0" g="0" b="0"/>
-        </a:effectRef>
-        <a:fontRef idx="minor">
-          <a:schemeClr val="lt1"/>
-        </a:fontRef>
-      </dsp:style>
-      <dsp:txBody>
-        <a:bodyPr spcFirstLastPara="0" vert="horz" wrap="square" lIns="45720" tIns="45720" rIns="45720" bIns="45720" numCol="1" spcCol="1270" anchor="ctr" anchorCtr="0">
-          <a:noAutofit/>
-        </a:bodyPr>
-        <a:lstStyle/>
-        <a:p>
-          <a:pPr lvl="0" algn="ctr" defTabSz="533400">
-            <a:lnSpc>
-              <a:spcPct val="90000"/>
-            </a:lnSpc>
-            <a:spcBef>
-              <a:spcPct val="0"/>
-            </a:spcBef>
-            <a:spcAft>
-              <a:spcPct val="35000"/>
-            </a:spcAft>
-          </a:pPr>
-          <a:r>
-            <a:rPr lang="pt-BR" sz="1200" kern="1200" dirty="0" smtClean="0"/>
-            <a:t>Criar VSM Estado Atual </a:t>
-          </a:r>
-          <a:endParaRPr lang="en-US" sz="1200" kern="1200" dirty="0"/>
-        </a:p>
-      </dsp:txBody>
-      <dsp:txXfrm>
-        <a:off x="5408164" y="4275051"/>
-        <a:ext cx="1004907" cy="1448560"/>
-      </dsp:txXfrm>
-    </dsp:sp>
-    <dsp:sp modelId="{AD6F85CF-E0A7-420D-B41E-B96673FC5338}">
-      <dsp:nvSpPr>
-        <dsp:cNvPr id="0" name=""/>
-        <dsp:cNvSpPr/>
-      </dsp:nvSpPr>
-      <dsp:spPr>
-        <a:xfrm>
-          <a:off x="6714341" y="4866969"/>
-          <a:ext cx="572410" cy="264723"/>
-        </a:xfrm>
-        <a:prstGeom prst="rightArrow">
-          <a:avLst>
-            <a:gd name="adj1" fmla="val 60000"/>
-            <a:gd name="adj2" fmla="val 50000"/>
-          </a:avLst>
-        </a:prstGeom>
-        <a:solidFill>
-          <a:schemeClr val="accent1">
-            <a:tint val="60000"/>
-            <a:hueOff val="0"/>
-            <a:satOff val="0"/>
-            <a:lumOff val="0"/>
-            <a:alphaOff val="0"/>
-          </a:schemeClr>
-        </a:solidFill>
-        <a:ln>
-          <a:noFill/>
-        </a:ln>
-        <a:effectLst/>
-      </dsp:spPr>
-      <dsp:style>
-        <a:lnRef idx="0">
-          <a:scrgbClr r="0" g="0" b="0"/>
-        </a:lnRef>
-        <a:fillRef idx="1">
-          <a:scrgbClr r="0" g="0" b="0"/>
-        </a:fillRef>
-        <a:effectRef idx="0">
-          <a:scrgbClr r="0" g="0" b="0"/>
-        </a:effectRef>
-        <a:fontRef idx="minor">
-          <a:schemeClr val="lt1"/>
-        </a:fontRef>
-      </dsp:style>
-      <dsp:txBody>
-        <a:bodyPr spcFirstLastPara="0" vert="horz" wrap="square" lIns="0" tIns="0" rIns="0" bIns="0" numCol="1" spcCol="1270" anchor="ctr" anchorCtr="0">
-          <a:noAutofit/>
-        </a:bodyPr>
-        <a:lstStyle/>
-        <a:p>
-          <a:pPr lvl="0" algn="ctr" defTabSz="444500">
-            <a:lnSpc>
-              <a:spcPct val="90000"/>
-            </a:lnSpc>
-            <a:spcBef>
-              <a:spcPct val="0"/>
-            </a:spcBef>
-            <a:spcAft>
-              <a:spcPct val="35000"/>
-            </a:spcAft>
-          </a:pPr>
-          <a:endParaRPr lang="en-US" sz="1000" kern="1200"/>
-        </a:p>
-      </dsp:txBody>
-      <dsp:txXfrm>
-        <a:off x="6714341" y="4919914"/>
-        <a:ext cx="492993" cy="158833"/>
-      </dsp:txXfrm>
-    </dsp:sp>
-    <dsp:sp modelId="{E0CDA61B-FDA4-4FA5-A2F3-965314EC53FC}">
-      <dsp:nvSpPr>
-        <dsp:cNvPr id="0" name=""/>
-        <dsp:cNvSpPr/>
-      </dsp:nvSpPr>
-      <dsp:spPr>
-        <a:xfrm>
-          <a:off x="7524356" y="4243787"/>
-          <a:ext cx="1067435" cy="1511088"/>
-        </a:xfrm>
-        <a:prstGeom prst="roundRect">
-          <a:avLst>
-            <a:gd name="adj" fmla="val 10000"/>
-          </a:avLst>
-        </a:prstGeom>
-        <a:solidFill>
-          <a:schemeClr val="accent1">
-            <a:hueOff val="0"/>
-            <a:satOff val="0"/>
-            <a:lumOff val="0"/>
-            <a:alphaOff val="0"/>
-          </a:schemeClr>
-        </a:solidFill>
-        <a:ln w="15875" cap="flat" cmpd="sng" algn="ctr">
-          <a:solidFill>
-            <a:schemeClr val="lt1">
-              <a:hueOff val="0"/>
-              <a:satOff val="0"/>
-              <a:lumOff val="0"/>
-              <a:alphaOff val="0"/>
-            </a:schemeClr>
-          </a:solidFill>
-          <a:prstDash val="solid"/>
-        </a:ln>
-        <a:effectLst/>
-      </dsp:spPr>
-      <dsp:style>
-        <a:lnRef idx="2">
-          <a:scrgbClr r="0" g="0" b="0"/>
-        </a:lnRef>
-        <a:fillRef idx="1">
-          <a:scrgbClr r="0" g="0" b="0"/>
-        </a:fillRef>
-        <a:effectRef idx="0">
-          <a:scrgbClr r="0" g="0" b="0"/>
-        </a:effectRef>
-        <a:fontRef idx="minor">
-          <a:schemeClr val="lt1"/>
-        </a:fontRef>
-      </dsp:style>
-      <dsp:txBody>
-        <a:bodyPr spcFirstLastPara="0" vert="horz" wrap="square" lIns="45720" tIns="45720" rIns="45720" bIns="45720" numCol="1" spcCol="1270" anchor="ctr" anchorCtr="0">
-          <a:noAutofit/>
-        </a:bodyPr>
-        <a:lstStyle/>
-        <a:p>
-          <a:pPr lvl="0" algn="ctr" defTabSz="533400">
-            <a:lnSpc>
-              <a:spcPct val="90000"/>
-            </a:lnSpc>
-            <a:spcBef>
-              <a:spcPct val="0"/>
-            </a:spcBef>
-            <a:spcAft>
-              <a:spcPct val="35000"/>
-            </a:spcAft>
-          </a:pPr>
-          <a:r>
-            <a:rPr lang="pt-BR" sz="1200" kern="1200" dirty="0" smtClean="0"/>
-            <a:t>Identificar causas priorizar e  comprovar</a:t>
-          </a:r>
-          <a:endParaRPr lang="en-US" sz="1200" kern="1200" dirty="0"/>
-        </a:p>
-      </dsp:txBody>
-      <dsp:txXfrm>
-        <a:off x="7555620" y="4275051"/>
-        <a:ext cx="1004907" cy="1448560"/>
-      </dsp:txXfrm>
-    </dsp:sp>
-    <dsp:sp modelId="{96AC33B3-5D5E-4E22-AEF4-025C0C5DB44C}">
-      <dsp:nvSpPr>
-        <dsp:cNvPr id="0" name=""/>
-        <dsp:cNvSpPr/>
-      </dsp:nvSpPr>
-      <dsp:spPr>
-        <a:xfrm>
-          <a:off x="8883484" y="4866969"/>
-          <a:ext cx="618388" cy="264723"/>
-        </a:xfrm>
-        <a:prstGeom prst="rightArrow">
-          <a:avLst>
-            <a:gd name="adj1" fmla="val 60000"/>
-            <a:gd name="adj2" fmla="val 50000"/>
-          </a:avLst>
-        </a:prstGeom>
-        <a:solidFill>
-          <a:schemeClr val="accent1">
-            <a:tint val="60000"/>
-            <a:hueOff val="0"/>
-            <a:satOff val="0"/>
-            <a:lumOff val="0"/>
-            <a:alphaOff val="0"/>
-          </a:schemeClr>
-        </a:solidFill>
-        <a:ln>
-          <a:noFill/>
-        </a:ln>
-        <a:effectLst/>
-      </dsp:spPr>
-      <dsp:style>
-        <a:lnRef idx="0">
-          <a:scrgbClr r="0" g="0" b="0"/>
-        </a:lnRef>
-        <a:fillRef idx="1">
-          <a:scrgbClr r="0" g="0" b="0"/>
-        </a:fillRef>
-        <a:effectRef idx="0">
-          <a:scrgbClr r="0" g="0" b="0"/>
-        </a:effectRef>
-        <a:fontRef idx="minor">
-          <a:schemeClr val="lt1"/>
-        </a:fontRef>
-      </dsp:style>
-      <dsp:txBody>
-        <a:bodyPr spcFirstLastPara="0" vert="horz" wrap="square" lIns="0" tIns="0" rIns="0" bIns="0" numCol="1" spcCol="1270" anchor="ctr" anchorCtr="0">
-          <a:noAutofit/>
-        </a:bodyPr>
-        <a:lstStyle/>
-        <a:p>
-          <a:pPr lvl="0" algn="ctr" defTabSz="444500">
-            <a:lnSpc>
-              <a:spcPct val="90000"/>
-            </a:lnSpc>
-            <a:spcBef>
-              <a:spcPct val="0"/>
-            </a:spcBef>
-            <a:spcAft>
-              <a:spcPct val="35000"/>
-            </a:spcAft>
-          </a:pPr>
-          <a:endParaRPr lang="en-US" sz="1000" kern="1200"/>
-        </a:p>
-      </dsp:txBody>
-      <dsp:txXfrm>
-        <a:off x="8883484" y="4919914"/>
-        <a:ext cx="538971" cy="158833"/>
-      </dsp:txXfrm>
-    </dsp:sp>
-    <dsp:sp modelId="{DF66BDFE-BC43-424F-8DF1-B69DD604C968}">
-      <dsp:nvSpPr>
-        <dsp:cNvPr id="0" name=""/>
-        <dsp:cNvSpPr/>
-      </dsp:nvSpPr>
-      <dsp:spPr>
-        <a:xfrm>
-          <a:off x="9758563" y="4243787"/>
-          <a:ext cx="1067435" cy="1511088"/>
-        </a:xfrm>
-        <a:prstGeom prst="roundRect">
-          <a:avLst>
-            <a:gd name="adj" fmla="val 10000"/>
-          </a:avLst>
-        </a:prstGeom>
-        <a:solidFill>
-          <a:schemeClr val="accent1">
-            <a:hueOff val="0"/>
-            <a:satOff val="0"/>
-            <a:lumOff val="0"/>
-            <a:alphaOff val="0"/>
-          </a:schemeClr>
-        </a:solidFill>
-        <a:ln w="15875" cap="flat" cmpd="sng" algn="ctr">
-          <a:solidFill>
-            <a:schemeClr val="lt1">
-              <a:hueOff val="0"/>
-              <a:satOff val="0"/>
-              <a:lumOff val="0"/>
-              <a:alphaOff val="0"/>
-            </a:schemeClr>
-          </a:solidFill>
-          <a:prstDash val="solid"/>
-        </a:ln>
-        <a:effectLst/>
-      </dsp:spPr>
-      <dsp:style>
-        <a:lnRef idx="2">
-          <a:scrgbClr r="0" g="0" b="0"/>
-        </a:lnRef>
-        <a:fillRef idx="1">
-          <a:scrgbClr r="0" g="0" b="0"/>
-        </a:fillRef>
-        <a:effectRef idx="0">
-          <a:scrgbClr r="0" g="0" b="0"/>
-        </a:effectRef>
-        <a:fontRef idx="minor">
-          <a:schemeClr val="lt1"/>
-        </a:fontRef>
-      </dsp:style>
-      <dsp:txBody>
-        <a:bodyPr spcFirstLastPara="0" vert="horz" wrap="square" lIns="45720" tIns="45720" rIns="45720" bIns="45720" numCol="1" spcCol="1270" anchor="ctr" anchorCtr="0">
-          <a:noAutofit/>
-        </a:bodyPr>
-        <a:lstStyle/>
-        <a:p>
-          <a:pPr lvl="0" algn="ctr" defTabSz="533400">
-            <a:lnSpc>
-              <a:spcPct val="90000"/>
-            </a:lnSpc>
-            <a:spcBef>
-              <a:spcPct val="0"/>
-            </a:spcBef>
-            <a:spcAft>
-              <a:spcPct val="35000"/>
-            </a:spcAft>
-          </a:pPr>
-          <a:r>
-            <a:rPr lang="pt-BR" sz="1200" kern="1200" dirty="0" smtClean="0"/>
-            <a:t>Desenhar VSM Estado Futuro</a:t>
-          </a:r>
-          <a:endParaRPr lang="en-US" sz="1200" kern="1200" dirty="0"/>
-        </a:p>
-      </dsp:txBody>
-      <dsp:txXfrm>
-        <a:off x="9789827" y="4275051"/>
-        <a:ext cx="1004907" cy="1448560"/>
-      </dsp:txXfrm>
-    </dsp:sp>
   </dsp:spTree>
 </dsp:drawing>
 </file>
@@ -3972,7 +2950,7 @@
           <a:p>
             <a:fld id="{4BDF68E2-58F2-4D09-BE8B-E3BD06533059}" type="datetimeFigureOut">
               <a:rPr lang="en-US" dirty="0"/>
-              <a:t>8/1/2017</a:t>
+              <a:t>8/10/2017</a:t>
             </a:fld>
             <a:endParaRPr lang="en-US" dirty="0"/>
           </a:p>
@@ -4175,7 +3153,7 @@
           <a:p>
             <a:fld id="{2E2D6473-DF6D-4702-B328-E0DD40540A4E}" type="datetimeFigureOut">
               <a:rPr lang="en-US" dirty="0"/>
-              <a:t>8/1/2017</a:t>
+              <a:t>8/10/2017</a:t>
             </a:fld>
             <a:endParaRPr lang="en-US" dirty="0"/>
           </a:p>
@@ -4426,7 +3404,7 @@
           <a:p>
             <a:fld id="{E26F7E3A-B166-407D-9866-32884E7D5B37}" type="datetimeFigureOut">
               <a:rPr lang="en-US" dirty="0"/>
-              <a:t>8/1/2017</a:t>
+              <a:t>8/10/2017</a:t>
             </a:fld>
             <a:endParaRPr lang="en-US" dirty="0"/>
           </a:p>
@@ -4595,7 +3573,7 @@
           <a:p>
             <a:fld id="{528FC5F6-F338-4AE4-BB23-26385BCFC423}" type="datetimeFigureOut">
               <a:rPr lang="en-US" dirty="0"/>
-              <a:t>8/1/2017</a:t>
+              <a:t>8/10/2017</a:t>
             </a:fld>
             <a:endParaRPr lang="en-US" dirty="0"/>
           </a:p>
@@ -4933,7 +3911,7 @@
           <a:p>
             <a:fld id="{20EBB0C4-6273-4C6E-B9BD-2EDC30F1CD52}" type="datetimeFigureOut">
               <a:rPr lang="en-US" dirty="0"/>
-              <a:t>8/1/2017</a:t>
+              <a:t>8/10/2017</a:t>
             </a:fld>
             <a:endParaRPr lang="en-US" dirty="0"/>
           </a:p>
@@ -5203,7 +4181,7 @@
           <a:p>
             <a:fld id="{19AB4D41-86C1-4908-B66A-0B50CEB3BF29}" type="datetimeFigureOut">
               <a:rPr lang="en-US" dirty="0"/>
-              <a:t>8/1/2017</a:t>
+              <a:t>8/10/2017</a:t>
             </a:fld>
             <a:endParaRPr lang="en-US" dirty="0"/>
           </a:p>
@@ -5577,7 +4555,7 @@
           <a:p>
             <a:fld id="{E6426E2C-56C1-4E0D-A793-0088A7FDD37E}" type="datetimeFigureOut">
               <a:rPr lang="en-US" dirty="0"/>
-              <a:t>8/1/2017</a:t>
+              <a:t>8/10/2017</a:t>
             </a:fld>
             <a:endParaRPr lang="en-US" dirty="0"/>
           </a:p>
@@ -5690,7 +4668,7 @@
           <a:p>
             <a:fld id="{C8C39B41-D8B5-4052-B551-9B5525EAA8B6}" type="datetimeFigureOut">
               <a:rPr lang="en-US" dirty="0"/>
-              <a:t>8/1/2017</a:t>
+              <a:t>8/10/2017</a:t>
             </a:fld>
             <a:endParaRPr lang="en-US" dirty="0"/>
           </a:p>
@@ -5856,7 +4834,7 @@
           <a:p>
             <a:fld id="{4D94136C-8742-45B2-AF27-D93DF72833A9}" type="datetimeFigureOut">
               <a:rPr lang="en-US" dirty="0"/>
-              <a:t>8/1/2017</a:t>
+              <a:t>8/10/2017</a:t>
             </a:fld>
             <a:endParaRPr lang="en-US" dirty="0"/>
           </a:p>
@@ -6206,7 +5184,7 @@
           <a:p>
             <a:fld id="{32ABBEA6-7C60-4B02-AE87-00D78D8422AF}" type="datetimeFigureOut">
               <a:rPr lang="en-US" dirty="0"/>
-              <a:t>8/1/2017</a:t>
+              <a:t>8/10/2017</a:t>
             </a:fld>
             <a:endParaRPr lang="en-US" dirty="0"/>
           </a:p>
@@ -6584,7 +5562,7 @@
           <a:p>
             <a:fld id="{C9CAD897-D46E-4AD2-BD9B-49DD3E640873}" type="datetimeFigureOut">
               <a:rPr lang="en-US" dirty="0"/>
-              <a:t>8/1/2017</a:t>
+              <a:t>8/10/2017</a:t>
             </a:fld>
             <a:endParaRPr lang="en-US" dirty="0"/>
           </a:p>
@@ -6866,7 +5844,7 @@
           <a:p>
             <a:fld id="{98624D31-43A5-475A-80CF-332C9F6DCF35}" type="datetimeFigureOut">
               <a:rPr lang="en-US" dirty="0"/>
-              <a:t>8/1/2017</a:t>
+              <a:t>8/10/2017</a:t>
             </a:fld>
             <a:endParaRPr lang="en-US" dirty="0"/>
           </a:p>
@@ -7427,19 +6405,7 @@
           <a:p>
             <a:r>
               <a:rPr lang="pt-BR" dirty="0" smtClean="0"/>
-              <a:t>Fase </a:t>
-            </a:r>
-            <a:r>
-              <a:rPr lang="pt-BR" dirty="0" smtClean="0"/>
-              <a:t>ANALYZE</a:t>
-            </a:r>
-            <a:r>
-              <a:rPr lang="pt-BR" dirty="0" smtClean="0"/>
-              <a:t>- ANALISAR</a:t>
-            </a:r>
-            <a:r>
-              <a:rPr lang="pt-BR" dirty="0" smtClean="0"/>
-              <a:t/>
+              <a:t>Fase ANALYZE- ANALISAR</a:t>
             </a:r>
             <a:br>
               <a:rPr lang="pt-BR" dirty="0" smtClean="0"/>
@@ -7469,6 +6435,363 @@
 </file>
 
 <file path=ppt/slides/slide10.xml><?xml version="1.0" encoding="utf-8"?>
+<p:sld xmlns:a="http://schemas.openxmlformats.org/drawingml/2006/main" xmlns:r="http://schemas.openxmlformats.org/officeDocument/2006/relationships" xmlns:p="http://schemas.openxmlformats.org/presentationml/2006/main">
+  <p:cSld>
+    <p:spTree>
+      <p:nvGrpSpPr>
+        <p:cNvPr id="1" name=""/>
+        <p:cNvGrpSpPr/>
+        <p:nvPr/>
+      </p:nvGrpSpPr>
+      <p:grpSpPr>
+        <a:xfrm>
+          <a:off x="0" y="0"/>
+          <a:ext cx="0" cy="0"/>
+          <a:chOff x="0" y="0"/>
+          <a:chExt cx="0" cy="0"/>
+        </a:xfrm>
+      </p:grpSpPr>
+      <p:sp>
+        <p:nvSpPr>
+          <p:cNvPr id="3" name="Título 1"/>
+          <p:cNvSpPr>
+            <a:spLocks noGrp="1"/>
+          </p:cNvSpPr>
+          <p:nvPr>
+            <p:ph type="title"/>
+          </p:nvPr>
+        </p:nvSpPr>
+        <p:spPr>
+          <a:xfrm>
+            <a:off x="1097280" y="286603"/>
+            <a:ext cx="10058400" cy="1450757"/>
+          </a:xfrm>
+        </p:spPr>
+        <p:txBody>
+          <a:bodyPr/>
+          <a:lstStyle/>
+          <a:p>
+            <a:r>
+              <a:rPr lang="pt-BR" dirty="0" smtClean="0"/>
+              <a:t>2.Mapa </a:t>
+            </a:r>
+            <a:r>
+              <a:rPr lang="pt-BR" dirty="0" smtClean="0"/>
+              <a:t>de Processos</a:t>
+            </a:r>
+            <a:endParaRPr lang="pt-BR" dirty="0"/>
+          </a:p>
+        </p:txBody>
+      </p:sp>
+      <p:pic>
+        <p:nvPicPr>
+          <p:cNvPr id="3074" name="Picture 2" descr="Image result for mapa de processos seis sigma"/>
+          <p:cNvPicPr>
+            <a:picLocks noChangeAspect="1" noChangeArrowheads="1"/>
+          </p:cNvPicPr>
+          <p:nvPr/>
+        </p:nvPicPr>
+        <p:blipFill>
+          <a:blip r:embed="rId2">
+            <a:extLst>
+              <a:ext uri="{28A0092B-C50C-407E-A947-70E740481C1C}">
+                <a14:useLocalDpi xmlns:a14="http://schemas.microsoft.com/office/drawing/2010/main" val="0"/>
+              </a:ext>
+            </a:extLst>
+          </a:blip>
+          <a:srcRect/>
+          <a:stretch>
+            <a:fillRect/>
+          </a:stretch>
+        </p:blipFill>
+        <p:spPr bwMode="auto">
+          <a:xfrm>
+            <a:off x="1409189" y="2048129"/>
+            <a:ext cx="8177263" cy="3990747"/>
+          </a:xfrm>
+          <a:prstGeom prst="rect">
+            <a:avLst/>
+          </a:prstGeom>
+          <a:noFill/>
+          <a:extLst>
+            <a:ext uri="{909E8E84-426E-40DD-AFC4-6F175D3DCCD1}">
+              <a14:hiddenFill xmlns:a14="http://schemas.microsoft.com/office/drawing/2010/main">
+                <a:solidFill>
+                  <a:srgbClr val="FFFFFF"/>
+                </a:solidFill>
+              </a14:hiddenFill>
+            </a:ext>
+          </a:extLst>
+        </p:spPr>
+      </p:pic>
+    </p:spTree>
+    <p:extLst>
+      <p:ext uri="{BB962C8B-B14F-4D97-AF65-F5344CB8AC3E}">
+        <p14:creationId xmlns:p14="http://schemas.microsoft.com/office/powerpoint/2010/main" val="1248727425"/>
+      </p:ext>
+    </p:extLst>
+  </p:cSld>
+  <p:clrMapOvr>
+    <a:masterClrMapping/>
+  </p:clrMapOvr>
+  <p:timing>
+    <p:tnLst>
+      <p:par>
+        <p:cTn id="1" dur="indefinite" restart="never" nodeType="tmRoot"/>
+      </p:par>
+    </p:tnLst>
+  </p:timing>
+</p:sld>
+</file>
+
+<file path=ppt/slides/slide11.xml><?xml version="1.0" encoding="utf-8"?>
+<p:sld xmlns:a="http://schemas.openxmlformats.org/drawingml/2006/main" xmlns:r="http://schemas.openxmlformats.org/officeDocument/2006/relationships" xmlns:p="http://schemas.openxmlformats.org/presentationml/2006/main">
+  <p:cSld>
+    <p:spTree>
+      <p:nvGrpSpPr>
+        <p:cNvPr id="1" name=""/>
+        <p:cNvGrpSpPr/>
+        <p:nvPr/>
+      </p:nvGrpSpPr>
+      <p:grpSpPr>
+        <a:xfrm>
+          <a:off x="0" y="0"/>
+          <a:ext cx="0" cy="0"/>
+          <a:chOff x="0" y="0"/>
+          <a:chExt cx="0" cy="0"/>
+        </a:xfrm>
+      </p:grpSpPr>
+      <p:pic>
+        <p:nvPicPr>
+          <p:cNvPr id="4" name="Picture 4" descr="Related image"/>
+          <p:cNvPicPr>
+            <a:picLocks noChangeAspect="1" noChangeArrowheads="1"/>
+          </p:cNvPicPr>
+          <p:nvPr/>
+        </p:nvPicPr>
+        <p:blipFill>
+          <a:blip r:embed="rId2">
+            <a:extLst>
+              <a:ext uri="{28A0092B-C50C-407E-A947-70E740481C1C}">
+                <a14:useLocalDpi xmlns:a14="http://schemas.microsoft.com/office/drawing/2010/main" val="0"/>
+              </a:ext>
+            </a:extLst>
+          </a:blip>
+          <a:srcRect/>
+          <a:stretch>
+            <a:fillRect/>
+          </a:stretch>
+        </p:blipFill>
+        <p:spPr bwMode="auto">
+          <a:xfrm>
+            <a:off x="1373505" y="2714764"/>
+            <a:ext cx="9782175" cy="2657476"/>
+          </a:xfrm>
+          <a:prstGeom prst="rect">
+            <a:avLst/>
+          </a:prstGeom>
+          <a:noFill/>
+          <a:extLst>
+            <a:ext uri="{909E8E84-426E-40DD-AFC4-6F175D3DCCD1}">
+              <a14:hiddenFill xmlns:a14="http://schemas.microsoft.com/office/drawing/2010/main">
+                <a:solidFill>
+                  <a:srgbClr val="FFFFFF"/>
+                </a:solidFill>
+              </a14:hiddenFill>
+            </a:ext>
+          </a:extLst>
+        </p:spPr>
+      </p:pic>
+      <p:sp>
+        <p:nvSpPr>
+          <p:cNvPr id="5" name="Título 1"/>
+          <p:cNvSpPr txBox="1">
+            <a:spLocks/>
+          </p:cNvSpPr>
+          <p:nvPr/>
+        </p:nvSpPr>
+        <p:spPr>
+          <a:xfrm>
+            <a:off x="1249680" y="439003"/>
+            <a:ext cx="10058400" cy="1450757"/>
+          </a:xfrm>
+          <a:prstGeom prst="rect">
+            <a:avLst/>
+          </a:prstGeom>
+        </p:spPr>
+        <p:txBody>
+          <a:bodyPr vert="horz" lIns="91440" tIns="45720" rIns="91440" bIns="45720" rtlCol="0" anchor="b">
+            <a:normAutofit/>
+          </a:bodyPr>
+          <a:lstStyle>
+            <a:lvl1pPr marL="0" algn="l" defTabSz="914400" rtl="0" eaLnBrk="1" latinLnBrk="0" hangingPunct="1">
+              <a:lnSpc>
+                <a:spcPct val="85000"/>
+              </a:lnSpc>
+              <a:spcBef>
+                <a:spcPct val="0"/>
+              </a:spcBef>
+              <a:buNone/>
+              <a:defRPr sz="4800" kern="1200" spc="-50" baseline="0">
+                <a:solidFill>
+                  <a:schemeClr val="tx1">
+                    <a:lumMod val="75000"/>
+                    <a:lumOff val="25000"/>
+                  </a:schemeClr>
+                </a:solidFill>
+                <a:latin typeface="+mj-lt"/>
+                <a:ea typeface="+mj-ea"/>
+                <a:cs typeface="+mj-cs"/>
+              </a:defRPr>
+            </a:lvl1pPr>
+          </a:lstStyle>
+          <a:p>
+            <a:r>
+              <a:rPr lang="pt-BR" dirty="0" smtClean="0"/>
+              <a:t>2.Mapa </a:t>
+            </a:r>
+            <a:r>
+              <a:rPr lang="pt-BR" dirty="0" smtClean="0"/>
+              <a:t>de Processos</a:t>
+            </a:r>
+            <a:endParaRPr lang="pt-BR" dirty="0"/>
+          </a:p>
+        </p:txBody>
+      </p:sp>
+    </p:spTree>
+    <p:extLst>
+      <p:ext uri="{BB962C8B-B14F-4D97-AF65-F5344CB8AC3E}">
+        <p14:creationId xmlns:p14="http://schemas.microsoft.com/office/powerpoint/2010/main" val="1230069869"/>
+      </p:ext>
+    </p:extLst>
+  </p:cSld>
+  <p:clrMapOvr>
+    <a:masterClrMapping/>
+  </p:clrMapOvr>
+  <p:timing>
+    <p:tnLst>
+      <p:par>
+        <p:cTn id="1" dur="indefinite" restart="never" nodeType="tmRoot"/>
+      </p:par>
+    </p:tnLst>
+  </p:timing>
+</p:sld>
+</file>
+
+<file path=ppt/slides/slide12.xml><?xml version="1.0" encoding="utf-8"?>
+<p:sld xmlns:a="http://schemas.openxmlformats.org/drawingml/2006/main" xmlns:r="http://schemas.openxmlformats.org/officeDocument/2006/relationships" xmlns:p="http://schemas.openxmlformats.org/presentationml/2006/main">
+  <p:cSld>
+    <p:spTree>
+      <p:nvGrpSpPr>
+        <p:cNvPr id="1" name=""/>
+        <p:cNvGrpSpPr/>
+        <p:nvPr/>
+      </p:nvGrpSpPr>
+      <p:grpSpPr>
+        <a:xfrm>
+          <a:off x="0" y="0"/>
+          <a:ext cx="0" cy="0"/>
+          <a:chOff x="0" y="0"/>
+          <a:chExt cx="0" cy="0"/>
+        </a:xfrm>
+      </p:grpSpPr>
+      <p:sp>
+        <p:nvSpPr>
+          <p:cNvPr id="2" name="Título 1"/>
+          <p:cNvSpPr>
+            <a:spLocks noGrp="1"/>
+          </p:cNvSpPr>
+          <p:nvPr>
+            <p:ph type="title"/>
+          </p:nvPr>
+        </p:nvSpPr>
+        <p:spPr/>
+        <p:txBody>
+          <a:bodyPr/>
+          <a:lstStyle/>
+          <a:p>
+            <a:r>
+              <a:rPr lang="pt-BR" b="1" dirty="0" smtClean="0"/>
+              <a:t>3.Diagrama </a:t>
+            </a:r>
+            <a:r>
+              <a:rPr lang="pt-BR" b="1" dirty="0" smtClean="0"/>
+              <a:t>de Ishikawa + </a:t>
+            </a:r>
+            <a:r>
+              <a:rPr lang="pt-BR" b="1" dirty="0" smtClean="0"/>
+              <a:t>Matrix </a:t>
+            </a:r>
+            <a:r>
+              <a:rPr lang="pt-BR" b="1" dirty="0" smtClean="0"/>
+              <a:t>Esforço x Impacto</a:t>
+            </a:r>
+            <a:endParaRPr lang="pt-BR" dirty="0"/>
+          </a:p>
+        </p:txBody>
+      </p:sp>
+      <p:pic>
+        <p:nvPicPr>
+          <p:cNvPr id="4098" name="Picture 2" descr="Image result for mapa de processos seis sigma"/>
+          <p:cNvPicPr>
+            <a:picLocks noChangeAspect="1" noChangeArrowheads="1"/>
+          </p:cNvPicPr>
+          <p:nvPr/>
+        </p:nvPicPr>
+        <p:blipFill>
+          <a:blip r:embed="rId2">
+            <a:extLst>
+              <a:ext uri="{28A0092B-C50C-407E-A947-70E740481C1C}">
+                <a14:useLocalDpi xmlns:a14="http://schemas.microsoft.com/office/drawing/2010/main" val="0"/>
+              </a:ext>
+            </a:extLst>
+          </a:blip>
+          <a:srcRect/>
+          <a:stretch>
+            <a:fillRect/>
+          </a:stretch>
+        </p:blipFill>
+        <p:spPr bwMode="auto">
+          <a:xfrm>
+            <a:off x="918095" y="2020529"/>
+            <a:ext cx="10069453" cy="4250424"/>
+          </a:xfrm>
+          <a:prstGeom prst="rect">
+            <a:avLst/>
+          </a:prstGeom>
+          <a:noFill/>
+          <a:extLst>
+            <a:ext uri="{909E8E84-426E-40DD-AFC4-6F175D3DCCD1}">
+              <a14:hiddenFill xmlns:a14="http://schemas.microsoft.com/office/drawing/2010/main">
+                <a:solidFill>
+                  <a:srgbClr val="FFFFFF"/>
+                </a:solidFill>
+              </a14:hiddenFill>
+            </a:ext>
+          </a:extLst>
+        </p:spPr>
+      </p:pic>
+    </p:spTree>
+    <p:extLst>
+      <p:ext uri="{BB962C8B-B14F-4D97-AF65-F5344CB8AC3E}">
+        <p14:creationId xmlns:p14="http://schemas.microsoft.com/office/powerpoint/2010/main" val="1564299819"/>
+      </p:ext>
+    </p:extLst>
+  </p:cSld>
+  <p:clrMapOvr>
+    <a:masterClrMapping/>
+  </p:clrMapOvr>
+  <p:timing>
+    <p:tnLst>
+      <p:par>
+        <p:cTn id="1" dur="indefinite" restart="never" nodeType="tmRoot"/>
+      </p:par>
+    </p:tnLst>
+  </p:timing>
+</p:sld>
+</file>
+
+<file path=ppt/slides/slide13.xml><?xml version="1.0" encoding="utf-8"?>
 <p:sld xmlns:a="http://schemas.openxmlformats.org/drawingml/2006/main" xmlns:r="http://schemas.openxmlformats.org/officeDocument/2006/relationships" xmlns:p="http://schemas.openxmlformats.org/presentationml/2006/main">
   <p:cSld>
     <p:spTree>
@@ -7571,8 +6894,20 @@
           </a:lstStyle>
           <a:p>
             <a:r>
+              <a:rPr lang="pt-BR" dirty="0"/>
+              <a:t>4</a:t>
+            </a:r>
+            <a:r>
+              <a:rPr lang="pt-BR" smtClean="0"/>
+              <a:t>.</a:t>
+            </a:r>
+            <a:r>
+              <a:rPr lang="pt-BR" smtClean="0"/>
+              <a:t>Diagrama </a:t>
+            </a:r>
+            <a:r>
               <a:rPr lang="pt-BR" dirty="0" smtClean="0"/>
-              <a:t>Diagrama de Dispersão</a:t>
+              <a:t>de Dispersão</a:t>
             </a:r>
             <a:endParaRPr lang="pt-BR" dirty="0"/>
           </a:p>
@@ -7598,7 +6933,7 @@
 </p:sld>
 </file>
 
-<file path=ppt/slides/slide11.xml><?xml version="1.0" encoding="utf-8"?>
+<file path=ppt/slides/slide14.xml><?xml version="1.0" encoding="utf-8"?>
 <p:sld xmlns:a="http://schemas.openxmlformats.org/drawingml/2006/main" xmlns:r="http://schemas.openxmlformats.org/officeDocument/2006/relationships" xmlns:p="http://schemas.openxmlformats.org/presentationml/2006/main">
   <p:cSld>
     <p:spTree>
@@ -7623,7 +6958,7 @@
         </p:nvSpPr>
         <p:spPr>
           <a:xfrm>
-            <a:off x="1" y="0"/>
+            <a:off x="0" y="-285008"/>
             <a:ext cx="12192000" cy="6858000"/>
           </a:xfrm>
           <a:prstGeom prst="rect">
@@ -7668,7 +7003,7 @@
         </p:nvSpPr>
         <p:spPr>
           <a:xfrm>
-            <a:off x="1249680" y="439003"/>
+            <a:off x="1237805" y="142120"/>
             <a:ext cx="10058400" cy="1450757"/>
           </a:xfrm>
           <a:prstGeom prst="rect">
@@ -7704,7 +7039,7 @@
           <a:p>
             <a:r>
               <a:rPr lang="pt-BR" dirty="0" smtClean="0"/>
-              <a:t>Plano de atividades TER </a:t>
+              <a:t>Plano de atividades TRE </a:t>
             </a:r>
             <a:r>
               <a:rPr lang="pt-BR" dirty="0" err="1" smtClean="0"/>
@@ -7721,14 +7056,14 @@
           <p:nvPr>
             <p:extLst>
               <p:ext uri="{D42A27DB-BD31-4B8C-83A1-F6EECF244321}">
-                <p14:modId xmlns:p14="http://schemas.microsoft.com/office/powerpoint/2010/main" val="2993097745"/>
+                <p14:modId xmlns:p14="http://schemas.microsoft.com/office/powerpoint/2010/main" val="2783634032"/>
               </p:ext>
             </p:extLst>
           </p:nvPr>
         </p:nvGraphicFramePr>
         <p:xfrm>
-          <a:off x="365758" y="719666"/>
-          <a:ext cx="11536189" cy="5754876"/>
+          <a:off x="327906" y="1995054"/>
+          <a:ext cx="11536189" cy="4577938"/>
         </p:xfrm>
         <a:graphic>
           <a:graphicData uri="http://schemas.openxmlformats.org/drawingml/2006/diagram">
@@ -7875,15 +7210,7 @@
           <a:p>
             <a:r>
               <a:rPr lang="pt-BR" b="1" dirty="0"/>
-              <a:t>As </a:t>
-            </a:r>
-            <a:r>
-              <a:rPr lang="pt-BR" b="1" dirty="0"/>
-              <a:t>causas priorizadas foram comprovadas (quantificadas</a:t>
-            </a:r>
-            <a:r>
-              <a:rPr lang="pt-BR" b="1" dirty="0"/>
-              <a:t>)?</a:t>
+              <a:t>As causas priorizadas foram comprovadas (quantificadas)?</a:t>
             </a:r>
           </a:p>
           <a:p>
@@ -7984,26 +7311,42 @@
           <a:p>
             <a:r>
               <a:rPr lang="pt-BR" dirty="0" smtClean="0"/>
-              <a:t>VSM – Mapa de Fluxo de Valor </a:t>
-            </a:r>
-          </a:p>
-          <a:p>
+              <a:t>1.VSM </a:t>
+            </a:r>
             <a:r>
               <a:rPr lang="pt-BR" dirty="0" smtClean="0"/>
-              <a:t>Mapa de processo</a:t>
+              <a:t>– Mapa de Fluxo de Valor </a:t>
             </a:r>
           </a:p>
           <a:p>
             <a:r>
               <a:rPr lang="pt-BR" dirty="0" smtClean="0"/>
-              <a:t>Diagrama de Ishikawa + Matriz de Esforço  x Impacto</a:t>
+              <a:t>2.Mapa </a:t>
+            </a:r>
+            <a:r>
+              <a:rPr lang="pt-BR" dirty="0" smtClean="0"/>
+              <a:t>de processo</a:t>
+            </a:r>
+          </a:p>
+          <a:p>
+            <a:r>
+              <a:rPr lang="pt-BR" dirty="0" smtClean="0"/>
+              <a:t>3.Diagrama </a:t>
+            </a:r>
+            <a:r>
+              <a:rPr lang="pt-BR" dirty="0" smtClean="0"/>
+              <a:t>de Ishikawa + Matriz de Esforço  x Impacto</a:t>
             </a:r>
             <a:br>
               <a:rPr lang="pt-BR" dirty="0" smtClean="0"/>
             </a:br>
             <a:r>
               <a:rPr lang="pt-BR" dirty="0" smtClean="0"/>
-              <a:t>Diagramas de </a:t>
+              <a:t>4.Diagramas </a:t>
+            </a:r>
+            <a:r>
+              <a:rPr lang="pt-BR" dirty="0" smtClean="0"/>
+              <a:t>de </a:t>
             </a:r>
             <a:r>
               <a:rPr lang="pt-BR" dirty="0" err="1" smtClean="0"/>
@@ -8030,7 +7373,7 @@
           <a:p>
             <a:r>
               <a:rPr lang="pt-BR" dirty="0" smtClean="0"/>
-              <a:t>Matriz </a:t>
+              <a:t>5.Matriz </a:t>
             </a:r>
             <a:r>
               <a:rPr lang="pt-BR" dirty="0"/>
@@ -8150,7 +7493,12 @@
             <p:ph type="title"/>
           </p:nvPr>
         </p:nvSpPr>
-        <p:spPr/>
+        <p:spPr>
+          <a:xfrm>
+            <a:off x="1097280" y="286603"/>
+            <a:ext cx="10058400" cy="1185937"/>
+          </a:xfrm>
+        </p:spPr>
         <p:txBody>
           <a:bodyPr/>
           <a:lstStyle/>
@@ -8182,7 +7530,7 @@
         </p:spPr>
         <p:txBody>
           <a:bodyPr vert="horz" lIns="91440" tIns="45720" rIns="91440" bIns="45720" rtlCol="0" anchor="b">
-            <a:normAutofit fontScale="70000" lnSpcReduction="20000"/>
+            <a:normAutofit fontScale="62500" lnSpcReduction="20000"/>
           </a:bodyPr>
           <a:lstStyle>
             <a:lvl1pPr marL="0" algn="l" defTabSz="914400" rtl="0" eaLnBrk="1" latinLnBrk="0" hangingPunct="1">
@@ -8211,7 +7559,19 @@
               <a:rPr lang="pt-BR" sz="3200" dirty="0" smtClean="0">
                 <a:latin typeface="+mn-lt"/>
               </a:rPr>
-              <a:t>Lead time (Tempo de atravessamento)  - Finais de semana, feriados, horas não trabalhadas em  que o trâmite ficou parado.</a:t>
+              <a:t>Lead time (Tempo de atravessamento)  </a:t>
+            </a:r>
+            <a:r>
+              <a:rPr lang="pt-BR" sz="3200" dirty="0" smtClean="0">
+                <a:latin typeface="+mn-lt"/>
+              </a:rPr>
+              <a:t>-Considera horas trabalhadas + </a:t>
+            </a:r>
+            <a:r>
+              <a:rPr lang="pt-BR" sz="3200" dirty="0" smtClean="0">
+                <a:latin typeface="+mn-lt"/>
+              </a:rPr>
+              <a:t>Finais de semana, feriados, horas não trabalhadas em  que o trâmite ficou parado.</a:t>
             </a:r>
           </a:p>
           <a:p>
@@ -8220,6 +7580,12 @@
             </a:endParaRPr>
           </a:p>
           <a:p>
+            <a:r>
+              <a:rPr lang="pt-BR" sz="3200" dirty="0" smtClean="0">
+                <a:latin typeface="+mn-lt"/>
+              </a:rPr>
+              <a:t>Processing </a:t>
+            </a:r>
             <a:r>
               <a:rPr lang="pt-BR" sz="3200" dirty="0" err="1" smtClean="0">
                 <a:latin typeface="+mn-lt"/>
@@ -8230,7 +7596,7 @@
               <a:rPr lang="pt-BR" sz="3200" dirty="0" smtClean="0">
                 <a:latin typeface="+mn-lt"/>
               </a:rPr>
-              <a:t> Time(Tempo de Ciclo)  - Tempo que efetivamente foi trabalhado na atividade</a:t>
+              <a:t> Time(Tempo de Processamento de Ciclo)  - Tempo que efetivamente foi trabalhado na atividade(Descontado as esperas)</a:t>
             </a:r>
           </a:p>
           <a:p>
@@ -8249,7 +7615,7 @@
               <a:rPr lang="pt-BR" sz="3200" dirty="0" smtClean="0">
                 <a:latin typeface="+mn-lt"/>
               </a:rPr>
-              <a:t> Time – Ritmo da demanda de licitações.</a:t>
+              <a:t> Time – Ritmo da demanda de licitações.( (Tempo Operacional Liquido/Demanda)</a:t>
             </a:r>
             <a:br>
               <a:rPr lang="pt-BR" sz="3200" dirty="0" smtClean="0">
@@ -8283,7 +7649,7 @@
               <a:rPr lang="pt-BR" sz="3200" dirty="0" smtClean="0">
                 <a:latin typeface="+mn-lt"/>
               </a:rPr>
-              <a:t> ( Agregação de valor) – Atividades que agregam valor  ao trâmite  final. Criação do Estudo de viabilidade, Criação do Projeto Básico. Aprovação de  Orçamento.</a:t>
+              <a:t> ( Agregação de valor) – Atividades que agregam valor  ao trâmite  final. Criação do Estudo de viabilidade, Criação do Projeto Básico. Aprovação de  Orçamento.( Tempo de Processamento de Ciclo Total/ Lead time Total = % Tempo de agregação de valor </a:t>
             </a:r>
           </a:p>
           <a:p>
@@ -8357,22 +7723,22 @@
               <a:t>Eles </a:t>
             </a:r>
             <a:r>
-              <a:rPr lang="pt-BR" sz="3200" dirty="0" err="1" smtClean="0">
+              <a:rPr lang="pt-BR" sz="3200" dirty="0">
                 <a:latin typeface="+mn-lt"/>
               </a:rPr>
-              <a:t>involvem</a:t>
+              <a:t>e</a:t>
             </a:r>
             <a:r>
               <a:rPr lang="pt-BR" sz="3200" dirty="0" smtClean="0">
                 <a:latin typeface="+mn-lt"/>
               </a:rPr>
-              <a:t>  os 8 desper</a:t>
+              <a:t>nvolvem  </a:t>
             </a:r>
             <a:r>
               <a:rPr lang="pt-BR" sz="3200" dirty="0" smtClean="0">
                 <a:latin typeface="+mn-lt"/>
               </a:rPr>
-              <a:t>dícios mais graves no </a:t>
+              <a:t>os 8 desperdícios mais graves no </a:t>
             </a:r>
             <a:r>
               <a:rPr lang="pt-BR" sz="3200" dirty="0" err="1" smtClean="0">
@@ -8555,7 +7921,7 @@
       </p:grpSpPr>
       <p:sp>
         <p:nvSpPr>
-          <p:cNvPr id="3" name="Título 1"/>
+          <p:cNvPr id="2" name="Título 1"/>
           <p:cNvSpPr>
             <a:spLocks noGrp="1"/>
           </p:cNvSpPr>
@@ -8563,69 +7929,332 @@
             <p:ph type="title"/>
           </p:nvPr>
         </p:nvSpPr>
-        <p:spPr>
-          <a:xfrm>
-            <a:off x="1097280" y="286603"/>
-            <a:ext cx="10058400" cy="1450757"/>
-          </a:xfrm>
-        </p:spPr>
+        <p:spPr/>
         <p:txBody>
-          <a:bodyPr/>
+          <a:bodyPr>
+            <a:normAutofit/>
+          </a:bodyPr>
           <a:lstStyle/>
           <a:p>
             <a:r>
               <a:rPr lang="pt-BR" dirty="0" smtClean="0"/>
-              <a:t>Mapa de Processos</a:t>
-            </a:r>
-            <a:endParaRPr lang="pt-BR" dirty="0"/>
+              <a:t>Desperdícios </a:t>
+            </a:r>
+            <a:r>
+              <a:rPr lang="pt-BR" dirty="0"/>
+              <a:t>em office</a:t>
+            </a:r>
+            <a:br>
+              <a:rPr lang="pt-BR" dirty="0"/>
+            </a:br>
+            <a:r>
+              <a:rPr lang="pt-BR" sz="1600" dirty="0">
+                <a:hlinkClick r:id="rId2"/>
+              </a:rPr>
+              <a:t>https://www.lean.org.br/artigos/57/escritorio-enxuto-(lean-office).</a:t>
+            </a:r>
+            <a:r>
+              <a:rPr lang="pt-BR" sz="1600" dirty="0" smtClean="0">
+                <a:hlinkClick r:id="rId2"/>
+              </a:rPr>
+              <a:t>aspx</a:t>
+            </a:r>
+            <a:r>
+              <a:rPr lang="pt-BR" sz="1600" dirty="0" smtClean="0"/>
+              <a:t> </a:t>
+            </a:r>
+            <a:endParaRPr lang="pt-BR" sz="1600" dirty="0"/>
           </a:p>
         </p:txBody>
       </p:sp>
-      <p:pic>
-        <p:nvPicPr>
-          <p:cNvPr id="3074" name="Picture 2" descr="Image result for mapa de processos seis sigma"/>
-          <p:cNvPicPr>
-            <a:picLocks noChangeAspect="1" noChangeArrowheads="1"/>
-          </p:cNvPicPr>
-          <p:nvPr/>
-        </p:nvPicPr>
-        <p:blipFill>
-          <a:blip r:embed="rId2">
-            <a:extLst>
-              <a:ext uri="{28A0092B-C50C-407E-A947-70E740481C1C}">
-                <a14:useLocalDpi xmlns:a14="http://schemas.microsoft.com/office/drawing/2010/main" val="0"/>
-              </a:ext>
-            </a:extLst>
-          </a:blip>
-          <a:srcRect/>
-          <a:stretch>
-            <a:fillRect/>
-          </a:stretch>
-        </p:blipFill>
-        <p:spPr bwMode="auto">
-          <a:xfrm>
-            <a:off x="1409189" y="2048129"/>
-            <a:ext cx="8177263" cy="3990747"/>
-          </a:xfrm>
-          <a:prstGeom prst="rect">
-            <a:avLst/>
-          </a:prstGeom>
-          <a:noFill/>
-          <a:extLst>
-            <a:ext uri="{909E8E84-426E-40DD-AFC4-6F175D3DCCD1}">
-              <a14:hiddenFill xmlns:a14="http://schemas.microsoft.com/office/drawing/2010/main">
+      <p:sp>
+        <p:nvSpPr>
+          <p:cNvPr id="3" name="Espaço Reservado para Conteúdo 2"/>
+          <p:cNvSpPr>
+            <a:spLocks noGrp="1"/>
+          </p:cNvSpPr>
+          <p:nvPr>
+            <p:ph idx="1"/>
+          </p:nvPr>
+        </p:nvSpPr>
+        <p:spPr/>
+        <p:txBody>
+          <a:bodyPr>
+            <a:noAutofit/>
+          </a:bodyPr>
+          <a:lstStyle/>
+          <a:p>
+            <a:r>
+              <a:rPr lang="pt-BR" sz="1600" dirty="0"/>
+              <a:t>.</a:t>
+            </a:r>
+            <a:r>
+              <a:rPr lang="pt-BR" sz="1600" dirty="0" smtClean="0"/>
+              <a:t> </a:t>
+            </a:r>
+            <a:r>
+              <a:rPr lang="pt-BR" sz="1600" dirty="0" smtClean="0">
                 <a:solidFill>
-                  <a:srgbClr val="FFFFFF"/>
+                  <a:srgbClr val="00B050"/>
                 </a:solidFill>
-              </a14:hiddenFill>
-            </a:ext>
-          </a:extLst>
-        </p:spPr>
-      </p:pic>
+              </a:rPr>
+              <a:t>Alinhamento </a:t>
+            </a:r>
+            <a:r>
+              <a:rPr lang="pt-BR" sz="1600" dirty="0">
+                <a:solidFill>
+                  <a:srgbClr val="00B050"/>
+                </a:solidFill>
+              </a:rPr>
+              <a:t>de objetivos</a:t>
+            </a:r>
+            <a:r>
+              <a:rPr lang="pt-BR" sz="1600" dirty="0"/>
+              <a:t>: é a energia gasta por pessoas trabalhando com objetivos mal entendidos e o esforço necessário para corrigir o problema e produzir o resultado esperado</a:t>
+            </a:r>
+            <a:r>
+              <a:rPr lang="pt-BR" sz="1600" dirty="0" smtClean="0"/>
+              <a:t>;</a:t>
+            </a:r>
+          </a:p>
+          <a:p>
+            <a:r>
+              <a:rPr lang="pt-BR" sz="1600" dirty="0" smtClean="0"/>
+              <a:t>.</a:t>
+            </a:r>
+            <a:r>
+              <a:rPr lang="pt-BR" sz="1600" dirty="0" smtClean="0">
+                <a:solidFill>
+                  <a:srgbClr val="00B050"/>
+                </a:solidFill>
+              </a:rPr>
+              <a:t>Atribuição</a:t>
+            </a:r>
+            <a:r>
+              <a:rPr lang="pt-BR" sz="1600" dirty="0"/>
+              <a:t>: é o esforço usado para completar uma tarefa inapropriada e não necessária;</a:t>
+            </a:r>
+            <a:br>
+              <a:rPr lang="pt-BR" sz="1600" dirty="0"/>
+            </a:br>
+            <a:r>
+              <a:rPr lang="pt-BR" sz="1600" dirty="0"/>
+              <a:t>. </a:t>
+            </a:r>
+            <a:r>
+              <a:rPr lang="pt-BR" sz="1600" dirty="0">
+                <a:solidFill>
+                  <a:srgbClr val="00B050"/>
+                </a:solidFill>
+              </a:rPr>
+              <a:t>Espera</a:t>
+            </a:r>
+            <a:r>
+              <a:rPr lang="pt-BR" sz="1600" dirty="0"/>
+              <a:t>: é o recurso perdido enquanto pessoas esperam por informações, reuniões, assinaturas, o retorno de uma ligação e assim por diante;</a:t>
+            </a:r>
+            <a:br>
+              <a:rPr lang="pt-BR" sz="1600" dirty="0"/>
+            </a:br>
+            <a:r>
+              <a:rPr lang="pt-BR" sz="1600" dirty="0"/>
+              <a:t>. </a:t>
+            </a:r>
+            <a:r>
+              <a:rPr lang="pt-BR" sz="1600" dirty="0">
+                <a:solidFill>
+                  <a:srgbClr val="00B050"/>
+                </a:solidFill>
+              </a:rPr>
+              <a:t>Movimento</a:t>
+            </a:r>
+            <a:r>
+              <a:rPr lang="pt-BR" sz="1600" dirty="0"/>
+              <a:t>: é o esforço perdido em movimentações desnecessárias;</a:t>
+            </a:r>
+            <a:br>
+              <a:rPr lang="pt-BR" sz="1600" dirty="0"/>
+            </a:br>
+            <a:r>
+              <a:rPr lang="pt-BR" sz="1600" dirty="0"/>
+              <a:t>.</a:t>
+            </a:r>
+            <a:r>
+              <a:rPr lang="pt-BR" sz="1600" dirty="0">
+                <a:solidFill>
+                  <a:srgbClr val="00B050"/>
+                </a:solidFill>
+              </a:rPr>
+              <a:t> Processamento</a:t>
+            </a:r>
+            <a:r>
+              <a:rPr lang="pt-BR" sz="1600" dirty="0"/>
+              <a:t>: um trabalho não executado da melhor forma é um desperdício de processamento;</a:t>
+            </a:r>
+            <a:br>
+              <a:rPr lang="pt-BR" sz="1600" dirty="0"/>
+            </a:br>
+            <a:r>
+              <a:rPr lang="pt-BR" sz="1600" dirty="0"/>
+              <a:t>. </a:t>
+            </a:r>
+            <a:r>
+              <a:rPr lang="pt-BR" sz="1600" dirty="0">
+                <a:solidFill>
+                  <a:srgbClr val="00B050"/>
+                </a:solidFill>
+              </a:rPr>
+              <a:t>Controle</a:t>
+            </a:r>
+            <a:r>
+              <a:rPr lang="pt-BR" sz="1600" dirty="0"/>
+              <a:t>: é a energia usada para controlar e monitorar e que não produz melhorias no desempenho;</a:t>
+            </a:r>
+            <a:br>
+              <a:rPr lang="pt-BR" sz="1600" dirty="0"/>
+            </a:br>
+            <a:r>
+              <a:rPr lang="pt-BR" sz="1600" dirty="0"/>
+              <a:t>. </a:t>
+            </a:r>
+            <a:r>
+              <a:rPr lang="pt-BR" sz="1600" dirty="0">
+                <a:solidFill>
+                  <a:srgbClr val="00B050"/>
+                </a:solidFill>
+              </a:rPr>
+              <a:t>Variabilidade</a:t>
+            </a:r>
+            <a:r>
+              <a:rPr lang="pt-BR" sz="1600" dirty="0"/>
+              <a:t>: são recursos utilizados para compensar ou corrigir resultados que variam do esperado;</a:t>
+            </a:r>
+            <a:br>
+              <a:rPr lang="pt-BR" sz="1600" dirty="0"/>
+            </a:br>
+            <a:r>
+              <a:rPr lang="pt-BR" sz="1600" dirty="0"/>
+              <a:t>. </a:t>
+            </a:r>
+            <a:r>
+              <a:rPr lang="pt-BR" sz="1600" dirty="0">
+                <a:solidFill>
+                  <a:srgbClr val="00B050"/>
+                </a:solidFill>
+              </a:rPr>
+              <a:t>Alteração</a:t>
+            </a:r>
+            <a:r>
+              <a:rPr lang="pt-BR" sz="1600" dirty="0"/>
+              <a:t>: é o esforço usado para mudar arbitrariamente um processo sem conhecer todas as </a:t>
+            </a:r>
+            <a:r>
+              <a:rPr lang="pt-BR" sz="1600" dirty="0" err="1"/>
+              <a:t>conseqüências</a:t>
+            </a:r>
+            <a:r>
+              <a:rPr lang="pt-BR" sz="1600" dirty="0"/>
+              <a:t> e os esforços seguintes para compensar as </a:t>
+            </a:r>
+            <a:r>
+              <a:rPr lang="pt-BR" sz="1600" dirty="0" err="1"/>
+              <a:t>conseqüências</a:t>
+            </a:r>
+            <a:r>
+              <a:rPr lang="pt-BR" sz="1600" dirty="0"/>
+              <a:t> inesperadas;</a:t>
+            </a:r>
+            <a:br>
+              <a:rPr lang="pt-BR" sz="1600" dirty="0"/>
+            </a:br>
+            <a:r>
+              <a:rPr lang="pt-BR" sz="1600" dirty="0"/>
+              <a:t>. </a:t>
+            </a:r>
+            <a:r>
+              <a:rPr lang="pt-BR" sz="1600" dirty="0">
+                <a:solidFill>
+                  <a:srgbClr val="00B050"/>
+                </a:solidFill>
+              </a:rPr>
+              <a:t>Estratégia</a:t>
+            </a:r>
+            <a:r>
+              <a:rPr lang="pt-BR" sz="1600" dirty="0"/>
+              <a:t>: é o valor perdido ao implementar processos que satisfazem objetivos de curto prazo, mas que não agregam valor aos clientes e investidores;</a:t>
+            </a:r>
+            <a:br>
+              <a:rPr lang="pt-BR" sz="1600" dirty="0"/>
+            </a:br>
+            <a:r>
+              <a:rPr lang="pt-BR" sz="1600" dirty="0"/>
+              <a:t>. </a:t>
+            </a:r>
+            <a:r>
+              <a:rPr lang="pt-BR" sz="1600" dirty="0">
+                <a:solidFill>
+                  <a:srgbClr val="00B050"/>
+                </a:solidFill>
+              </a:rPr>
+              <a:t>Confiabilidade</a:t>
+            </a:r>
+            <a:r>
+              <a:rPr lang="pt-BR" sz="1600" dirty="0"/>
+              <a:t>: é o esforço necessário para corrigir resultados imprevisíveis devido a causas desconhecidas;</a:t>
+            </a:r>
+            <a:br>
+              <a:rPr lang="pt-BR" sz="1600" dirty="0"/>
+            </a:br>
+            <a:r>
+              <a:rPr lang="pt-BR" sz="1600" dirty="0"/>
+              <a:t>. </a:t>
+            </a:r>
+            <a:r>
+              <a:rPr lang="pt-BR" sz="1600" dirty="0">
+                <a:solidFill>
+                  <a:srgbClr val="00B050"/>
+                </a:solidFill>
+              </a:rPr>
+              <a:t>Padronização: </a:t>
+            </a:r>
+            <a:r>
+              <a:rPr lang="pt-BR" sz="1600" dirty="0"/>
+              <a:t>é a energia gasta por causa de um trabalho não ter sido feito da melhor forma possível por todos os responsáveis;</a:t>
+            </a:r>
+            <a:br>
+              <a:rPr lang="pt-BR" sz="1600" dirty="0"/>
+            </a:br>
+            <a:r>
+              <a:rPr lang="pt-BR" sz="1600" dirty="0"/>
+              <a:t>. </a:t>
+            </a:r>
+            <a:r>
+              <a:rPr lang="pt-BR" sz="1600" dirty="0" err="1">
+                <a:solidFill>
+                  <a:srgbClr val="00B050"/>
+                </a:solidFill>
+              </a:rPr>
+              <a:t>Subotimização</a:t>
+            </a:r>
+            <a:r>
+              <a:rPr lang="pt-BR" sz="1600" dirty="0"/>
+              <a:t>: é causada pela concorrência de dois processos, no melhor caso o desperdício será o trabalho duplicado, mas pode chegar ao comprometimento de ambos os processos e na degradação do resultado final;</a:t>
+            </a:r>
+            <a:br>
+              <a:rPr lang="pt-BR" sz="1600" dirty="0"/>
+            </a:br>
+            <a:r>
+              <a:rPr lang="pt-BR" sz="1600" dirty="0" smtClean="0"/>
+              <a:t>.</a:t>
+            </a:r>
+            <a:endParaRPr lang="pt-BR" sz="1600" dirty="0"/>
+          </a:p>
+        </p:txBody>
+      </p:sp>
     </p:spTree>
     <p:extLst>
       <p:ext uri="{BB962C8B-B14F-4D97-AF65-F5344CB8AC3E}">
-        <p14:creationId xmlns:p14="http://schemas.microsoft.com/office/powerpoint/2010/main" val="1248727425"/>
+        <p14:creationId xmlns:p14="http://schemas.microsoft.com/office/powerpoint/2010/main" val="3211985773"/>
       </p:ext>
     </p:extLst>
   </p:cSld>
@@ -8659,103 +8288,207 @@
           <a:chExt cx="0" cy="0"/>
         </a:xfrm>
       </p:grpSpPr>
-      <p:pic>
-        <p:nvPicPr>
-          <p:cNvPr id="4" name="Picture 4" descr="Related image"/>
-          <p:cNvPicPr>
-            <a:picLocks noChangeAspect="1" noChangeArrowheads="1"/>
-          </p:cNvPicPr>
-          <p:nvPr/>
-        </p:nvPicPr>
-        <p:blipFill>
-          <a:blip r:embed="rId2">
-            <a:extLst>
-              <a:ext uri="{28A0092B-C50C-407E-A947-70E740481C1C}">
-                <a14:useLocalDpi xmlns:a14="http://schemas.microsoft.com/office/drawing/2010/main" val="0"/>
-              </a:ext>
-            </a:extLst>
-          </a:blip>
-          <a:srcRect/>
-          <a:stretch>
-            <a:fillRect/>
-          </a:stretch>
-        </p:blipFill>
-        <p:spPr bwMode="auto">
-          <a:xfrm>
-            <a:off x="1373505" y="2714764"/>
-            <a:ext cx="9782175" cy="2657476"/>
-          </a:xfrm>
-          <a:prstGeom prst="rect">
-            <a:avLst/>
-          </a:prstGeom>
-          <a:noFill/>
-          <a:extLst>
-            <a:ext uri="{909E8E84-426E-40DD-AFC4-6F175D3DCCD1}">
-              <a14:hiddenFill xmlns:a14="http://schemas.microsoft.com/office/drawing/2010/main">
-                <a:solidFill>
-                  <a:srgbClr val="FFFFFF"/>
-                </a:solidFill>
-              </a14:hiddenFill>
-            </a:ext>
-          </a:extLst>
-        </p:spPr>
-      </p:pic>
-      <p:sp>
-        <p:nvSpPr>
-          <p:cNvPr id="5" name="Título 1"/>
-          <p:cNvSpPr txBox="1">
-            <a:spLocks/>
+      <p:sp>
+        <p:nvSpPr>
+          <p:cNvPr id="2" name="Título 1"/>
+          <p:cNvSpPr>
+            <a:spLocks noGrp="1"/>
           </p:cNvSpPr>
-          <p:nvPr/>
-        </p:nvSpPr>
-        <p:spPr>
-          <a:xfrm>
-            <a:off x="1249680" y="439003"/>
-            <a:ext cx="10058400" cy="1450757"/>
-          </a:xfrm>
-          <a:prstGeom prst="rect">
-            <a:avLst/>
-          </a:prstGeom>
-        </p:spPr>
+          <p:nvPr>
+            <p:ph type="title"/>
+          </p:nvPr>
+        </p:nvSpPr>
+        <p:spPr/>
         <p:txBody>
-          <a:bodyPr vert="horz" lIns="91440" tIns="45720" rIns="91440" bIns="45720" rtlCol="0" anchor="b">
+          <a:bodyPr/>
+          <a:lstStyle/>
+          <a:p>
+            <a:r>
+              <a:rPr lang="pt-BR" dirty="0" smtClean="0"/>
+              <a:t>Desperdícios em office</a:t>
+            </a:r>
+            <a:endParaRPr lang="pt-BR" dirty="0"/>
+          </a:p>
+        </p:txBody>
+      </p:sp>
+      <p:sp>
+        <p:nvSpPr>
+          <p:cNvPr id="3" name="Espaço Reservado para Conteúdo 2"/>
+          <p:cNvSpPr>
+            <a:spLocks noGrp="1"/>
+          </p:cNvSpPr>
+          <p:nvPr>
+            <p:ph idx="1"/>
+          </p:nvPr>
+        </p:nvSpPr>
+        <p:spPr/>
+        <p:txBody>
+          <a:bodyPr>
             <a:normAutofit/>
           </a:bodyPr>
-          <a:lstStyle>
-            <a:lvl1pPr marL="0" algn="l" defTabSz="914400" rtl="0" eaLnBrk="1" latinLnBrk="0" hangingPunct="1">
-              <a:lnSpc>
-                <a:spcPct val="85000"/>
-              </a:lnSpc>
-              <a:spcBef>
-                <a:spcPct val="0"/>
-              </a:spcBef>
-              <a:buNone/>
-              <a:defRPr sz="4800" kern="1200" spc="-50" baseline="0">
+          <a:lstStyle/>
+          <a:p>
+            <a:r>
+              <a:rPr lang="pt-BR" sz="1800" dirty="0"/>
+              <a:t> </a:t>
+            </a:r>
+            <a:r>
+              <a:rPr lang="pt-BR" sz="1600" dirty="0">
                 <a:solidFill>
-                  <a:schemeClr val="tx1">
-                    <a:lumMod val="75000"/>
-                    <a:lumOff val="25000"/>
-                  </a:schemeClr>
+                  <a:srgbClr val="00B050"/>
                 </a:solidFill>
-                <a:latin typeface="+mj-lt"/>
-                <a:ea typeface="+mj-ea"/>
-                <a:cs typeface="+mj-cs"/>
-              </a:defRPr>
-            </a:lvl1pPr>
-          </a:lstStyle>
-          <a:p>
-            <a:r>
-              <a:rPr lang="pt-BR" dirty="0" smtClean="0"/>
-              <a:t>Mapa de Processos</a:t>
-            </a:r>
-            <a:endParaRPr lang="pt-BR" dirty="0"/>
+              </a:rPr>
+              <a:t>Agenda</a:t>
+            </a:r>
+            <a:r>
+              <a:rPr lang="pt-BR" sz="1600" dirty="0"/>
+              <a:t>: é a má utilização dos horários e da agenda;</a:t>
+            </a:r>
+            <a:br>
+              <a:rPr lang="pt-BR" sz="1600" dirty="0"/>
+            </a:br>
+            <a:r>
+              <a:rPr lang="pt-BR" sz="1600" dirty="0"/>
+              <a:t>. </a:t>
+            </a:r>
+            <a:r>
+              <a:rPr lang="pt-BR" sz="1600" dirty="0">
+                <a:solidFill>
+                  <a:srgbClr val="00B050"/>
+                </a:solidFill>
+              </a:rPr>
+              <a:t>Processos informais</a:t>
+            </a:r>
+            <a:r>
+              <a:rPr lang="pt-BR" sz="1600" dirty="0"/>
+              <a:t>: ocorre quando recursos são usados para criar e manter processos informais que substituem os processos oficiais ou que conflitam com outros processos  informais, e também os recursos utilizados para corrigir os erros causados por este sistema;</a:t>
+            </a:r>
+            <a:br>
+              <a:rPr lang="pt-BR" sz="1600" dirty="0"/>
+            </a:br>
+            <a:r>
+              <a:rPr lang="pt-BR" sz="1600" dirty="0"/>
+              <a:t>. </a:t>
+            </a:r>
+            <a:r>
+              <a:rPr lang="pt-BR" sz="1600" dirty="0">
+                <a:solidFill>
+                  <a:srgbClr val="00B050"/>
+                </a:solidFill>
+              </a:rPr>
+              <a:t>Fluxo irregular</a:t>
+            </a:r>
+            <a:r>
+              <a:rPr lang="pt-BR" sz="1600" dirty="0"/>
+              <a:t>: recursos investidos em materiais ou informações que se acumulam entre as estações de trabalho e criam o desperdício de fluxo irregular;</a:t>
+            </a:r>
+            <a:br>
+              <a:rPr lang="pt-BR" sz="1600" dirty="0"/>
+            </a:br>
+            <a:r>
+              <a:rPr lang="pt-BR" sz="1600" dirty="0"/>
+              <a:t>. </a:t>
+            </a:r>
+            <a:r>
+              <a:rPr lang="pt-BR" sz="1600" dirty="0">
+                <a:solidFill>
+                  <a:srgbClr val="00B050"/>
+                </a:solidFill>
+              </a:rPr>
+              <a:t>Checagens desnecessárias</a:t>
+            </a:r>
+            <a:r>
+              <a:rPr lang="pt-BR" sz="1600" dirty="0"/>
+              <a:t>: é o esforço usado para inspeções e </a:t>
+            </a:r>
+            <a:r>
+              <a:rPr lang="pt-BR" sz="1600" dirty="0" err="1"/>
+              <a:t>re-trabalhos</a:t>
+            </a:r>
+            <a:r>
+              <a:rPr lang="pt-BR" sz="1600" dirty="0"/>
+              <a:t>;</a:t>
+            </a:r>
+            <a:br>
+              <a:rPr lang="pt-BR" sz="1600" dirty="0"/>
+            </a:br>
+            <a:r>
+              <a:rPr lang="pt-BR" sz="1600" dirty="0"/>
+              <a:t>. </a:t>
+            </a:r>
+            <a:r>
+              <a:rPr lang="pt-BR" sz="1600" dirty="0">
+                <a:solidFill>
+                  <a:srgbClr val="00B050"/>
+                </a:solidFill>
+              </a:rPr>
+              <a:t>Erros</a:t>
+            </a:r>
+            <a:r>
+              <a:rPr lang="pt-BR" sz="1600" dirty="0"/>
+              <a:t>: são causados pelos esforços necessários para refazer um trabalho que não pôde ser utilizado;</a:t>
+            </a:r>
+            <a:br>
+              <a:rPr lang="pt-BR" sz="1600" dirty="0"/>
+            </a:br>
+            <a:r>
+              <a:rPr lang="pt-BR" sz="1600" dirty="0"/>
+              <a:t>. </a:t>
+            </a:r>
+            <a:r>
+              <a:rPr lang="pt-BR" sz="1600" dirty="0">
+                <a:solidFill>
+                  <a:srgbClr val="00B050"/>
+                </a:solidFill>
+              </a:rPr>
+              <a:t>Tradução</a:t>
+            </a:r>
+            <a:r>
+              <a:rPr lang="pt-BR" sz="1600" dirty="0"/>
+              <a:t>: é o esforço requerido para alterar dados, formatos e relatórios entre passos de um processo ou seus responsáveis;</a:t>
+            </a:r>
+            <a:br>
+              <a:rPr lang="pt-BR" sz="1600" dirty="0"/>
+            </a:br>
+            <a:r>
+              <a:rPr lang="pt-BR" sz="1600" dirty="0"/>
+              <a:t>. </a:t>
+            </a:r>
+            <a:r>
+              <a:rPr lang="pt-BR" sz="1600" dirty="0">
+                <a:solidFill>
+                  <a:srgbClr val="00B050"/>
+                </a:solidFill>
+              </a:rPr>
+              <a:t>Informação perdida</a:t>
+            </a:r>
+            <a:r>
+              <a:rPr lang="pt-BR" sz="1600" dirty="0"/>
+              <a:t>: ocorre quando recursos são requeridos para reparar ou compensar as </a:t>
+            </a:r>
+            <a:r>
+              <a:rPr lang="pt-BR" sz="1600" dirty="0" err="1"/>
+              <a:t>conseqüências</a:t>
+            </a:r>
+            <a:r>
+              <a:rPr lang="pt-BR" sz="1600" dirty="0"/>
+              <a:t> da falta de informações chave;</a:t>
+            </a:r>
+            <a:r>
+              <a:rPr lang="pt-BR" sz="1800" dirty="0"/>
+              <a:t/>
+            </a:r>
+            <a:br>
+              <a:rPr lang="pt-BR" sz="1800" dirty="0"/>
+            </a:br>
+            <a:endParaRPr lang="pt-BR" sz="1800" dirty="0"/>
           </a:p>
         </p:txBody>
       </p:sp>
     </p:spTree>
     <p:extLst>
       <p:ext uri="{BB962C8B-B14F-4D97-AF65-F5344CB8AC3E}">
-        <p14:creationId xmlns:p14="http://schemas.microsoft.com/office/powerpoint/2010/main" val="1230069869"/>
+        <p14:creationId xmlns:p14="http://schemas.microsoft.com/office/powerpoint/2010/main" val="1336862141"/>
       </p:ext>
     </p:extLst>
   </p:cSld>
@@ -8805,58 +8538,218 @@
           <a:lstStyle/>
           <a:p>
             <a:r>
-              <a:rPr lang="pt-BR" b="1" dirty="0" smtClean="0"/>
-              <a:t>Diagrama de Ishikawa + Matrix Esforço x Impacto</a:t>
+              <a:rPr lang="pt-BR" dirty="0" smtClean="0"/>
+              <a:t>Desperdícios em office</a:t>
             </a:r>
             <a:endParaRPr lang="pt-BR" dirty="0"/>
           </a:p>
         </p:txBody>
       </p:sp>
-      <p:pic>
-        <p:nvPicPr>
-          <p:cNvPr id="4098" name="Picture 2" descr="Image result for mapa de processos seis sigma"/>
-          <p:cNvPicPr>
-            <a:picLocks noChangeAspect="1" noChangeArrowheads="1"/>
-          </p:cNvPicPr>
-          <p:nvPr/>
-        </p:nvPicPr>
-        <p:blipFill>
-          <a:blip r:embed="rId2">
-            <a:extLst>
-              <a:ext uri="{28A0092B-C50C-407E-A947-70E740481C1C}">
-                <a14:useLocalDpi xmlns:a14="http://schemas.microsoft.com/office/drawing/2010/main" val="0"/>
-              </a:ext>
-            </a:extLst>
-          </a:blip>
-          <a:srcRect/>
-          <a:stretch>
-            <a:fillRect/>
-          </a:stretch>
-        </p:blipFill>
-        <p:spPr bwMode="auto">
-          <a:xfrm>
-            <a:off x="918095" y="2020529"/>
-            <a:ext cx="10069453" cy="4250424"/>
-          </a:xfrm>
-          <a:prstGeom prst="rect">
-            <a:avLst/>
-          </a:prstGeom>
-          <a:noFill/>
-          <a:extLst>
-            <a:ext uri="{909E8E84-426E-40DD-AFC4-6F175D3DCCD1}">
-              <a14:hiddenFill xmlns:a14="http://schemas.microsoft.com/office/drawing/2010/main">
+      <p:sp>
+        <p:nvSpPr>
+          <p:cNvPr id="4" name="Espaço Reservado para Conteúdo 3"/>
+          <p:cNvSpPr>
+            <a:spLocks noGrp="1"/>
+          </p:cNvSpPr>
+          <p:nvPr>
+            <p:ph idx="1"/>
+          </p:nvPr>
+        </p:nvSpPr>
+        <p:spPr/>
+        <p:txBody>
+          <a:bodyPr>
+            <a:normAutofit fontScale="77500" lnSpcReduction="20000"/>
+          </a:bodyPr>
+          <a:lstStyle/>
+          <a:p>
+            <a:r>
+              <a:rPr lang="pt-BR" dirty="0"/>
+              <a:t>. </a:t>
+            </a:r>
+            <a:r>
+              <a:rPr lang="pt-BR" dirty="0">
                 <a:solidFill>
-                  <a:srgbClr val="FFFFFF"/>
+                  <a:srgbClr val="00B050"/>
                 </a:solidFill>
-              </a14:hiddenFill>
-            </a:ext>
-          </a:extLst>
-        </p:spPr>
-      </p:pic>
+              </a:rPr>
+              <a:t>Falta de integração</a:t>
+            </a:r>
+            <a:r>
+              <a:rPr lang="pt-BR" dirty="0"/>
+              <a:t>: é o esforço necessário para transferir informações (ou materiais) dentro de uma organização (departamento ou grupos) que não estão completamente integradas à cadeia de processos utilizados;</a:t>
+            </a:r>
+            <a:br>
+              <a:rPr lang="pt-BR" dirty="0"/>
+            </a:br>
+            <a:r>
+              <a:rPr lang="pt-BR" dirty="0"/>
+              <a:t>. Irrelevância: esforços empregados para lidar com informações desnecessárias ou esforços para fixar problemas que isso causa;</a:t>
+            </a:r>
+            <a:br>
+              <a:rPr lang="pt-BR" dirty="0"/>
+            </a:br>
+            <a:r>
+              <a:rPr lang="pt-BR" dirty="0"/>
+              <a:t>. </a:t>
+            </a:r>
+            <a:r>
+              <a:rPr lang="pt-BR" dirty="0">
+                <a:solidFill>
+                  <a:srgbClr val="00B050"/>
+                </a:solidFill>
+              </a:rPr>
+              <a:t>Inexatidão</a:t>
+            </a:r>
+            <a:r>
+              <a:rPr lang="pt-BR" dirty="0"/>
+              <a:t>: é o esforço usado para criar informações incorretas ou para lidar com as </a:t>
+            </a:r>
+            <a:r>
+              <a:rPr lang="pt-BR" dirty="0" err="1"/>
+              <a:t>conseqüências</a:t>
+            </a:r>
+            <a:r>
+              <a:rPr lang="pt-BR" dirty="0"/>
+              <a:t> disso;</a:t>
+            </a:r>
+            <a:br>
+              <a:rPr lang="pt-BR" dirty="0"/>
+            </a:br>
+            <a:r>
+              <a:rPr lang="pt-BR" dirty="0"/>
+              <a:t>. </a:t>
+            </a:r>
+            <a:r>
+              <a:rPr lang="pt-BR" dirty="0">
+                <a:solidFill>
+                  <a:srgbClr val="00B050"/>
+                </a:solidFill>
+              </a:rPr>
+              <a:t>Inventário</a:t>
+            </a:r>
+            <a:r>
+              <a:rPr lang="pt-BR" dirty="0"/>
+              <a:t>: são todos os recursos aplicados a um serviço antes dele ser requerido, todos os materiais que não estão sendo utilizados e todos os materiais que já estão prontos para serem entregues e estão aguardando;</a:t>
+            </a:r>
+            <a:br>
+              <a:rPr lang="pt-BR" dirty="0"/>
+            </a:br>
+            <a:r>
+              <a:rPr lang="pt-BR" dirty="0"/>
+              <a:t>. Processos secundários: são os recursos despendidos em processos secundários que ainda não podem ser utilizados pelos passos seguintes do processo;</a:t>
+            </a:r>
+            <a:br>
+              <a:rPr lang="pt-BR" dirty="0"/>
+            </a:br>
+            <a:r>
+              <a:rPr lang="pt-BR" dirty="0"/>
+              <a:t>. </a:t>
+            </a:r>
+            <a:r>
+              <a:rPr lang="pt-BR" dirty="0">
+                <a:solidFill>
+                  <a:srgbClr val="00B050"/>
+                </a:solidFill>
+              </a:rPr>
+              <a:t>Ativos subutilizados</a:t>
+            </a:r>
+            <a:r>
+              <a:rPr lang="pt-BR" dirty="0"/>
+              <a:t>: são os equipamentos e prédios que não estão sendo usados de forma máxima;</a:t>
+            </a:r>
+            <a:br>
+              <a:rPr lang="pt-BR" dirty="0"/>
+            </a:br>
+            <a:r>
+              <a:rPr lang="pt-BR" dirty="0"/>
+              <a:t>. Transporte: todo transporte de materiais e informações, exceto aqueles utilizados para entregar produtos e serviços aos clientes;</a:t>
+            </a:r>
+            <a:br>
+              <a:rPr lang="pt-BR" dirty="0"/>
+            </a:br>
+            <a:r>
+              <a:rPr lang="pt-BR" dirty="0"/>
+              <a:t>. </a:t>
+            </a:r>
+            <a:r>
+              <a:rPr lang="pt-BR" dirty="0">
+                <a:solidFill>
+                  <a:srgbClr val="00B050"/>
+                </a:solidFill>
+              </a:rPr>
+              <a:t>Falta de foco</a:t>
+            </a:r>
+            <a:r>
+              <a:rPr lang="pt-BR" dirty="0"/>
+              <a:t>: ocorre toda vez que a energia e a atenção de um empregado não está voltada para os objetivos críticos da organização;</a:t>
+            </a:r>
+            <a:br>
+              <a:rPr lang="pt-BR" dirty="0"/>
+            </a:br>
+            <a:r>
+              <a:rPr lang="pt-BR" dirty="0"/>
+              <a:t>. </a:t>
+            </a:r>
+            <a:r>
+              <a:rPr lang="pt-BR" dirty="0">
+                <a:solidFill>
+                  <a:srgbClr val="00B050"/>
+                </a:solidFill>
+              </a:rPr>
+              <a:t>Estrutura</a:t>
+            </a:r>
+            <a:r>
+              <a:rPr lang="pt-BR" dirty="0"/>
+              <a:t>: acontece quando comportamentos existentes, expectativas, procedimentos, rituais, regulamentos, cargos e prioridades não estão reforçando, guiando, e orientando o melhor comportamento para redução de desperdícios e também quando existe muita diferença entre a estrutura organizacional da empresa e os elementos fundamentais encontrados nas organizações de classe mundial;</a:t>
+            </a:r>
+            <a:br>
+              <a:rPr lang="pt-BR" dirty="0"/>
+            </a:br>
+            <a:r>
+              <a:rPr lang="pt-BR" dirty="0"/>
+              <a:t>. </a:t>
+            </a:r>
+            <a:r>
+              <a:rPr lang="pt-BR" dirty="0">
+                <a:solidFill>
+                  <a:srgbClr val="00B050"/>
+                </a:solidFill>
+              </a:rPr>
+              <a:t>Disciplina</a:t>
+            </a:r>
+            <a:r>
+              <a:rPr lang="pt-BR" dirty="0"/>
+              <a:t>: ocorre sempre que existir uma falha no sistema de identificação acurada e reação rápida contra negligência, falta de responsabilidade e problemas relacionados à disciplina esperada dos empregados;</a:t>
+            </a:r>
+            <a:br>
+              <a:rPr lang="pt-BR" dirty="0"/>
+            </a:br>
+            <a:r>
+              <a:rPr lang="pt-BR" dirty="0"/>
+              <a:t>. </a:t>
+            </a:r>
+            <a:r>
+              <a:rPr lang="pt-BR" dirty="0">
+                <a:solidFill>
+                  <a:srgbClr val="00B050"/>
+                </a:solidFill>
+              </a:rPr>
+              <a:t>Domínio</a:t>
+            </a:r>
+            <a:r>
+              <a:rPr lang="pt-BR" dirty="0"/>
+              <a:t>: ocorre toda vez que uma oportunidade de aumentar o domínio de um empregado sobre sua área de trabalho não for utilizada;</a:t>
+            </a:r>
+          </a:p>
+          <a:p>
+            <a:endParaRPr lang="pt-BR" dirty="0"/>
+          </a:p>
+        </p:txBody>
+      </p:sp>
     </p:spTree>
     <p:extLst>
       <p:ext uri="{BB962C8B-B14F-4D97-AF65-F5344CB8AC3E}">
-        <p14:creationId xmlns:p14="http://schemas.microsoft.com/office/powerpoint/2010/main" val="1564299819"/>
+        <p14:creationId xmlns:p14="http://schemas.microsoft.com/office/powerpoint/2010/main" val="3295049304"/>
       </p:ext>
     </p:extLst>
   </p:cSld>

</xml_diff>